<commit_message>
add word clouds and explaination code
</commit_message>
<xml_diff>
--- a/eRumWorkshop.pptx
+++ b/eRumWorkshop.pptx
@@ -5,7 +5,7 @@
     <p:sldMasterId id="2147483684" r:id="rId1"/>
   </p:sldMasterIdLst>
   <p:notesMasterIdLst>
-    <p:notesMasterId r:id="rId43"/>
+    <p:notesMasterId r:id="rId44"/>
   </p:notesMasterIdLst>
   <p:sldIdLst>
     <p:sldId id="256" r:id="rId2"/>
@@ -18,37 +18,38 @@
     <p:sldId id="274" r:id="rId9"/>
     <p:sldId id="293" r:id="rId10"/>
     <p:sldId id="301" r:id="rId11"/>
-    <p:sldId id="310" r:id="rId12"/>
-    <p:sldId id="311" r:id="rId13"/>
-    <p:sldId id="307" r:id="rId14"/>
-    <p:sldId id="271" r:id="rId15"/>
-    <p:sldId id="262" r:id="rId16"/>
-    <p:sldId id="308" r:id="rId17"/>
-    <p:sldId id="275" r:id="rId18"/>
-    <p:sldId id="294" r:id="rId19"/>
-    <p:sldId id="306" r:id="rId20"/>
-    <p:sldId id="268" r:id="rId21"/>
-    <p:sldId id="278" r:id="rId22"/>
-    <p:sldId id="295" r:id="rId23"/>
-    <p:sldId id="300" r:id="rId24"/>
-    <p:sldId id="267" r:id="rId25"/>
-    <p:sldId id="286" r:id="rId26"/>
-    <p:sldId id="283" r:id="rId27"/>
-    <p:sldId id="287" r:id="rId28"/>
-    <p:sldId id="281" r:id="rId29"/>
-    <p:sldId id="269" r:id="rId30"/>
-    <p:sldId id="288" r:id="rId31"/>
-    <p:sldId id="289" r:id="rId32"/>
-    <p:sldId id="290" r:id="rId33"/>
-    <p:sldId id="279" r:id="rId34"/>
-    <p:sldId id="296" r:id="rId35"/>
-    <p:sldId id="305" r:id="rId36"/>
-    <p:sldId id="297" r:id="rId37"/>
-    <p:sldId id="298" r:id="rId38"/>
-    <p:sldId id="291" r:id="rId39"/>
-    <p:sldId id="270" r:id="rId40"/>
-    <p:sldId id="282" r:id="rId41"/>
-    <p:sldId id="292" r:id="rId42"/>
+    <p:sldId id="307" r:id="rId12"/>
+    <p:sldId id="310" r:id="rId13"/>
+    <p:sldId id="271" r:id="rId14"/>
+    <p:sldId id="262" r:id="rId15"/>
+    <p:sldId id="308" r:id="rId16"/>
+    <p:sldId id="311" r:id="rId17"/>
+    <p:sldId id="312" r:id="rId18"/>
+    <p:sldId id="275" r:id="rId19"/>
+    <p:sldId id="294" r:id="rId20"/>
+    <p:sldId id="306" r:id="rId21"/>
+    <p:sldId id="268" r:id="rId22"/>
+    <p:sldId id="278" r:id="rId23"/>
+    <p:sldId id="295" r:id="rId24"/>
+    <p:sldId id="300" r:id="rId25"/>
+    <p:sldId id="267" r:id="rId26"/>
+    <p:sldId id="286" r:id="rId27"/>
+    <p:sldId id="283" r:id="rId28"/>
+    <p:sldId id="287" r:id="rId29"/>
+    <p:sldId id="281" r:id="rId30"/>
+    <p:sldId id="269" r:id="rId31"/>
+    <p:sldId id="288" r:id="rId32"/>
+    <p:sldId id="289" r:id="rId33"/>
+    <p:sldId id="290" r:id="rId34"/>
+    <p:sldId id="279" r:id="rId35"/>
+    <p:sldId id="296" r:id="rId36"/>
+    <p:sldId id="305" r:id="rId37"/>
+    <p:sldId id="297" r:id="rId38"/>
+    <p:sldId id="298" r:id="rId39"/>
+    <p:sldId id="291" r:id="rId40"/>
+    <p:sldId id="270" r:id="rId41"/>
+    <p:sldId id="282" r:id="rId42"/>
+    <p:sldId id="292" r:id="rId43"/>
   </p:sldIdLst>
   <p:sldSz cx="12192000" cy="6858000"/>
   <p:notesSz cx="6858000" cy="9144000"/>
@@ -249,7 +250,7 @@
           <a:p>
             <a:fld id="{A07E8718-7DAF-448F-B4BC-06F32720EA63}" type="datetimeFigureOut">
               <a:rPr lang="en-GB" smtClean="0"/>
-              <a:t>14/04/2018</a:t>
+              <a:t>29/04/2018</a:t>
             </a:fld>
             <a:endParaRPr lang="en-GB"/>
           </a:p>
@@ -651,7 +652,23 @@
           <a:p>
             <a:r>
               <a:rPr lang="en-GB" dirty="0" smtClean="0"/>
-              <a:t>our corpus also has the number of tokens and sentences but I can't find the tokens themselves</a:t>
+              <a:t>This is in </a:t>
+            </a:r>
+            <a:r>
+              <a:rPr lang="en-GB" dirty="0" err="1" smtClean="0"/>
+              <a:t>quanteda</a:t>
+            </a:r>
+            <a:r>
+              <a:rPr lang="en-GB" dirty="0" smtClean="0"/>
+              <a:t>, in the tm package it is called term-document matric (</a:t>
+            </a:r>
+            <a:r>
+              <a:rPr lang="en-GB" dirty="0" err="1" smtClean="0"/>
+              <a:t>tdm</a:t>
+            </a:r>
+            <a:r>
+              <a:rPr lang="en-GB" dirty="0" smtClean="0"/>
+              <a:t>)</a:t>
             </a:r>
             <a:endParaRPr lang="en-GB" dirty="0"/>
           </a:p>
@@ -683,7 +700,7 @@
     </p:spTree>
     <p:extLst>
       <p:ext uri="{BB962C8B-B14F-4D97-AF65-F5344CB8AC3E}">
-        <p14:creationId xmlns:p14="http://schemas.microsoft.com/office/powerpoint/2010/main" val="3888628058"/>
+        <p14:creationId xmlns:p14="http://schemas.microsoft.com/office/powerpoint/2010/main" val="1076878071"/>
       </p:ext>
     </p:extLst>
   </p:cSld>
@@ -737,26 +754,6 @@
           <a:bodyPr/>
           <a:lstStyle/>
           <a:p>
-            <a:r>
-              <a:rPr lang="en-GB" dirty="0" smtClean="0"/>
-              <a:t>This is in </a:t>
-            </a:r>
-            <a:r>
-              <a:rPr lang="en-GB" dirty="0" err="1" smtClean="0"/>
-              <a:t>quanteda</a:t>
-            </a:r>
-            <a:r>
-              <a:rPr lang="en-GB" dirty="0" smtClean="0"/>
-              <a:t>, in the tm package it is called term-document matric (</a:t>
-            </a:r>
-            <a:r>
-              <a:rPr lang="en-GB" dirty="0" err="1" smtClean="0"/>
-              <a:t>tdm</a:t>
-            </a:r>
-            <a:r>
-              <a:rPr lang="en-GB" dirty="0" smtClean="0"/>
-              <a:t>)</a:t>
-            </a:r>
             <a:endParaRPr lang="en-GB" dirty="0"/>
           </a:p>
         </p:txBody>
@@ -778,7 +775,7 @@
           <a:p>
             <a:fld id="{C05174D8-1871-4FFC-91F2-59D97D5E1D31}" type="slidenum">
               <a:rPr lang="en-GB" smtClean="0"/>
-              <a:t>14</a:t>
+              <a:t>15</a:t>
             </a:fld>
             <a:endParaRPr lang="en-GB"/>
           </a:p>
@@ -787,7 +784,7 @@
     </p:spTree>
     <p:extLst>
       <p:ext uri="{BB962C8B-B14F-4D97-AF65-F5344CB8AC3E}">
-        <p14:creationId xmlns:p14="http://schemas.microsoft.com/office/powerpoint/2010/main" val="1076878071"/>
+        <p14:creationId xmlns:p14="http://schemas.microsoft.com/office/powerpoint/2010/main" val="1264840839"/>
       </p:ext>
     </p:extLst>
   </p:cSld>
@@ -871,7 +868,7 @@
     </p:spTree>
     <p:extLst>
       <p:ext uri="{BB962C8B-B14F-4D97-AF65-F5344CB8AC3E}">
-        <p14:creationId xmlns:p14="http://schemas.microsoft.com/office/powerpoint/2010/main" val="1264840839"/>
+        <p14:creationId xmlns:p14="http://schemas.microsoft.com/office/powerpoint/2010/main" val="3382241340"/>
       </p:ext>
     </p:extLst>
   </p:cSld>
@@ -927,11 +924,7 @@
           <a:p>
             <a:r>
               <a:rPr lang="en-GB" dirty="0" smtClean="0"/>
-              <a:t>Create the corpus, </a:t>
-            </a:r>
-            <a:r>
-              <a:rPr lang="en-GB" dirty="0" smtClean="0"/>
-              <a:t>create the </a:t>
+              <a:t>Create the corpus, create the </a:t>
             </a:r>
             <a:r>
               <a:rPr lang="en-GB" dirty="0" err="1" smtClean="0"/>
@@ -943,11 +936,7 @@
             </a:r>
             <a:r>
               <a:rPr lang="en-GB" baseline="0" dirty="0" smtClean="0"/>
-              <a:t> make </a:t>
-            </a:r>
-            <a:r>
-              <a:rPr lang="en-GB" baseline="0" dirty="0" smtClean="0"/>
-              <a:t>word clouds</a:t>
+              <a:t> make word clouds</a:t>
             </a:r>
             <a:endParaRPr lang="en-GB" dirty="0"/>
           </a:p>
@@ -970,7 +959,7 @@
           <a:p>
             <a:fld id="{C05174D8-1871-4FFC-91F2-59D97D5E1D31}" type="slidenum">
               <a:rPr lang="en-GB" smtClean="0"/>
-              <a:t>17</a:t>
+              <a:t>18</a:t>
             </a:fld>
             <a:endParaRPr lang="en-GB"/>
           </a:p>
@@ -1054,7 +1043,7 @@
           <a:p>
             <a:fld id="{C05174D8-1871-4FFC-91F2-59D97D5E1D31}" type="slidenum">
               <a:rPr lang="en-GB" smtClean="0"/>
-              <a:t>18</a:t>
+              <a:t>19</a:t>
             </a:fld>
             <a:endParaRPr lang="en-GB"/>
           </a:p>
@@ -1138,7 +1127,7 @@
           <a:p>
             <a:fld id="{C05174D8-1871-4FFC-91F2-59D97D5E1D31}" type="slidenum">
               <a:rPr lang="en-GB" smtClean="0"/>
-              <a:t>19</a:t>
+              <a:t>20</a:t>
             </a:fld>
             <a:endParaRPr lang="en-GB"/>
           </a:p>
@@ -1273,7 +1262,7 @@
           <a:p>
             <a:fld id="{C05174D8-1871-4FFC-91F2-59D97D5E1D31}" type="slidenum">
               <a:rPr lang="en-GB" smtClean="0"/>
-              <a:t>20</a:t>
+              <a:t>21</a:t>
             </a:fld>
             <a:endParaRPr lang="en-GB"/>
           </a:p>
@@ -1357,7 +1346,7 @@
           <a:p>
             <a:fld id="{C05174D8-1871-4FFC-91F2-59D97D5E1D31}" type="slidenum">
               <a:rPr lang="en-GB" smtClean="0"/>
-              <a:t>21</a:t>
+              <a:t>22</a:t>
             </a:fld>
             <a:endParaRPr lang="en-GB"/>
           </a:p>
@@ -1441,7 +1430,7 @@
           <a:p>
             <a:fld id="{C05174D8-1871-4FFC-91F2-59D97D5E1D31}" type="slidenum">
               <a:rPr lang="en-GB" smtClean="0"/>
-              <a:t>22</a:t>
+              <a:t>23</a:t>
             </a:fld>
             <a:endParaRPr lang="en-GB"/>
           </a:p>
@@ -1525,7 +1514,7 @@
           <a:p>
             <a:fld id="{C05174D8-1871-4FFC-91F2-59D97D5E1D31}" type="slidenum">
               <a:rPr lang="en-GB" smtClean="0"/>
-              <a:t>23</a:t>
+              <a:t>24</a:t>
             </a:fld>
             <a:endParaRPr lang="en-GB"/>
           </a:p>
@@ -1590,11 +1579,7 @@
           <a:p>
             <a:r>
               <a:rPr lang="en-GB" dirty="0" smtClean="0"/>
-              <a:t>Let’s get a photo of us together</a:t>
-            </a:r>
-            <a:r>
-              <a:rPr lang="en-GB" dirty="0" smtClean="0"/>
-              <a:t>!</a:t>
+              <a:t>Let’s get a photo of us together!</a:t>
             </a:r>
           </a:p>
           <a:p>
@@ -1707,7 +1692,7 @@
           <a:p>
             <a:fld id="{C05174D8-1871-4FFC-91F2-59D97D5E1D31}" type="slidenum">
               <a:rPr lang="en-GB" smtClean="0"/>
-              <a:t>25</a:t>
+              <a:t>26</a:t>
             </a:fld>
             <a:endParaRPr lang="en-GB"/>
           </a:p>
@@ -1791,7 +1776,7 @@
           <a:p>
             <a:fld id="{C05174D8-1871-4FFC-91F2-59D97D5E1D31}" type="slidenum">
               <a:rPr lang="en-GB" smtClean="0"/>
-              <a:t>26</a:t>
+              <a:t>27</a:t>
             </a:fld>
             <a:endParaRPr lang="en-GB"/>
           </a:p>
@@ -1875,7 +1860,7 @@
           <a:p>
             <a:fld id="{C05174D8-1871-4FFC-91F2-59D97D5E1D31}" type="slidenum">
               <a:rPr lang="en-GB" smtClean="0"/>
-              <a:t>27</a:t>
+              <a:t>28</a:t>
             </a:fld>
             <a:endParaRPr lang="en-GB"/>
           </a:p>
@@ -1959,7 +1944,7 @@
           <a:p>
             <a:fld id="{C05174D8-1871-4FFC-91F2-59D97D5E1D31}" type="slidenum">
               <a:rPr lang="en-GB" smtClean="0"/>
-              <a:t>28</a:t>
+              <a:t>29</a:t>
             </a:fld>
             <a:endParaRPr lang="en-GB"/>
           </a:p>
@@ -2043,7 +2028,7 @@
           <a:p>
             <a:fld id="{C05174D8-1871-4FFC-91F2-59D97D5E1D31}" type="slidenum">
               <a:rPr lang="en-GB" smtClean="0"/>
-              <a:t>30</a:t>
+              <a:t>31</a:t>
             </a:fld>
             <a:endParaRPr lang="en-GB"/>
           </a:p>
@@ -2127,7 +2112,7 @@
           <a:p>
             <a:fld id="{C05174D8-1871-4FFC-91F2-59D97D5E1D31}" type="slidenum">
               <a:rPr lang="en-GB" smtClean="0"/>
-              <a:t>31</a:t>
+              <a:t>32</a:t>
             </a:fld>
             <a:endParaRPr lang="en-GB"/>
           </a:p>
@@ -2211,7 +2196,7 @@
           <a:p>
             <a:fld id="{C05174D8-1871-4FFC-91F2-59D97D5E1D31}" type="slidenum">
               <a:rPr lang="en-GB" smtClean="0"/>
-              <a:t>32</a:t>
+              <a:t>33</a:t>
             </a:fld>
             <a:endParaRPr lang="en-GB"/>
           </a:p>
@@ -2295,7 +2280,7 @@
           <a:p>
             <a:fld id="{C05174D8-1871-4FFC-91F2-59D97D5E1D31}" type="slidenum">
               <a:rPr lang="en-GB" smtClean="0"/>
-              <a:t>33</a:t>
+              <a:t>34</a:t>
             </a:fld>
             <a:endParaRPr lang="en-GB"/>
           </a:p>
@@ -2379,7 +2364,7 @@
           <a:p>
             <a:fld id="{C05174D8-1871-4FFC-91F2-59D97D5E1D31}" type="slidenum">
               <a:rPr lang="en-GB" smtClean="0"/>
-              <a:t>34</a:t>
+              <a:t>35</a:t>
             </a:fld>
             <a:endParaRPr lang="en-GB"/>
           </a:p>
@@ -2463,7 +2448,7 @@
           <a:p>
             <a:fld id="{C05174D8-1871-4FFC-91F2-59D97D5E1D31}" type="slidenum">
               <a:rPr lang="en-GB" smtClean="0"/>
-              <a:t>35</a:t>
+              <a:t>36</a:t>
             </a:fld>
             <a:endParaRPr lang="en-GB"/>
           </a:p>
@@ -2635,7 +2620,7 @@
           <a:p>
             <a:fld id="{C05174D8-1871-4FFC-91F2-59D97D5E1D31}" type="slidenum">
               <a:rPr lang="en-GB" smtClean="0"/>
-              <a:t>36</a:t>
+              <a:t>37</a:t>
             </a:fld>
             <a:endParaRPr lang="en-GB"/>
           </a:p>
@@ -2719,7 +2704,7 @@
           <a:p>
             <a:fld id="{C05174D8-1871-4FFC-91F2-59D97D5E1D31}" type="slidenum">
               <a:rPr lang="en-GB" smtClean="0"/>
-              <a:t>37</a:t>
+              <a:t>38</a:t>
             </a:fld>
             <a:endParaRPr lang="en-GB"/>
           </a:p>
@@ -2803,7 +2788,7 @@
           <a:p>
             <a:fld id="{C05174D8-1871-4FFC-91F2-59D97D5E1D31}" type="slidenum">
               <a:rPr lang="en-GB" smtClean="0"/>
-              <a:t>38</a:t>
+              <a:t>39</a:t>
             </a:fld>
             <a:endParaRPr lang="en-GB"/>
           </a:p>
@@ -2887,7 +2872,7 @@
           <a:p>
             <a:fld id="{C05174D8-1871-4FFC-91F2-59D97D5E1D31}" type="slidenum">
               <a:rPr lang="en-GB" smtClean="0"/>
-              <a:t>39</a:t>
+              <a:t>40</a:t>
             </a:fld>
             <a:endParaRPr lang="en-GB"/>
           </a:p>
@@ -2988,7 +2973,7 @@
           <a:p>
             <a:fld id="{C05174D8-1871-4FFC-91F2-59D97D5E1D31}" type="slidenum">
               <a:rPr lang="en-GB" smtClean="0"/>
-              <a:t>40</a:t>
+              <a:t>41</a:t>
             </a:fld>
             <a:endParaRPr lang="en-GB"/>
           </a:p>
@@ -3072,7 +3057,7 @@
           <a:p>
             <a:fld id="{C05174D8-1871-4FFC-91F2-59D97D5E1D31}" type="slidenum">
               <a:rPr lang="en-GB" smtClean="0"/>
-              <a:t>41</a:t>
+              <a:t>42</a:t>
             </a:fld>
             <a:endParaRPr lang="en-GB"/>
           </a:p>
@@ -3509,53 +3494,42 @@
           <a:p>
             <a:r>
               <a:rPr lang="en-GB" dirty="0" smtClean="0"/>
-              <a:t>These are our features</a:t>
-            </a:r>
-          </a:p>
-          <a:p>
-            <a:r>
-              <a:rPr lang="en-GB" dirty="0" smtClean="0"/>
-              <a:t>Good </a:t>
-            </a:r>
-            <a:r>
-              <a:rPr lang="en-GB" dirty="0" smtClean="0"/>
-              <a:t>resources</a:t>
-            </a:r>
-          </a:p>
-          <a:p>
-            <a:pPr marL="0" marR="0" indent="0" algn="l" defTabSz="914400" rtl="0" eaLnBrk="1" fontAlgn="auto" latinLnBrk="0" hangingPunct="1">
-              <a:lnSpc>
-                <a:spcPct val="100000"/>
-              </a:lnSpc>
-              <a:spcBef>
-                <a:spcPts val="0"/>
-              </a:spcBef>
-              <a:spcAft>
-                <a:spcPts val="0"/>
-              </a:spcAft>
-              <a:buClrTx/>
-              <a:buSzTx/>
-              <a:buFontTx/>
-              <a:buNone/>
-              <a:tabLst/>
-              <a:defRPr/>
-            </a:pPr>
-            <a:r>
-              <a:rPr lang="en-GB" dirty="0" smtClean="0"/>
-              <a:t>Tokenisation: </a:t>
-            </a:r>
-            <a:r>
-              <a:rPr lang="en-GB" dirty="0" smtClean="0">
-                <a:hlinkClick r:id="rId3"/>
-              </a:rPr>
-              <a:t>https://nlp.stanford.edu/IR-book/html/htmledition/tokenization-1.html</a:t>
-            </a:r>
-            <a:r>
-              <a:rPr lang="en-GB" dirty="0" smtClean="0"/>
+              <a:t>We don’t really have a corpus as our text is in csv format and if we wanted to </a:t>
+            </a:r>
+          </a:p>
+          <a:p>
+            <a:r>
+              <a:rPr lang="en-GB" dirty="0" smtClean="0"/>
+              <a:t>In</a:t>
+            </a:r>
+            <a:r>
+              <a:rPr lang="en-GB" baseline="0" dirty="0" smtClean="0"/>
               <a:t> </a:t>
             </a:r>
-          </a:p>
-          <a:p>
+            <a:r>
+              <a:rPr lang="en-GB" baseline="0" dirty="0" err="1" smtClean="0"/>
+              <a:t>quanteda</a:t>
+            </a:r>
+            <a:r>
+              <a:rPr lang="en-GB" baseline="0" dirty="0" smtClean="0"/>
+              <a:t> summary(</a:t>
+            </a:r>
+            <a:r>
+              <a:rPr lang="en-GB" dirty="0" smtClean="0"/>
+              <a:t>corpus) </a:t>
+            </a:r>
+            <a:r>
+              <a:rPr lang="en-GB" dirty="0" smtClean="0"/>
+              <a:t>also has the number of tokens and sentences but </a:t>
+            </a:r>
+            <a:r>
+              <a:rPr lang="en-GB" dirty="0" smtClean="0"/>
+              <a:t>not </a:t>
+            </a:r>
+            <a:r>
+              <a:rPr lang="en-GB" dirty="0" smtClean="0"/>
+              <a:t>the tokens themselves</a:t>
+            </a:r>
             <a:endParaRPr lang="en-GB" dirty="0"/>
           </a:p>
         </p:txBody>
@@ -3586,7 +3560,7 @@
     </p:spTree>
     <p:extLst>
       <p:ext uri="{BB962C8B-B14F-4D97-AF65-F5344CB8AC3E}">
-        <p14:creationId xmlns:p14="http://schemas.microsoft.com/office/powerpoint/2010/main" val="1996164307"/>
+        <p14:creationId xmlns:p14="http://schemas.microsoft.com/office/powerpoint/2010/main" val="3888628058"/>
       </p:ext>
     </p:extLst>
   </p:cSld>
@@ -3640,6 +3614,51 @@
           <a:bodyPr/>
           <a:lstStyle/>
           <a:p>
+            <a:r>
+              <a:rPr lang="en-GB" dirty="0" smtClean="0"/>
+              <a:t>These are our features</a:t>
+            </a:r>
+          </a:p>
+          <a:p>
+            <a:r>
+              <a:rPr lang="en-GB" dirty="0" smtClean="0"/>
+              <a:t>Good resources</a:t>
+            </a:r>
+          </a:p>
+          <a:p>
+            <a:pPr marL="0" marR="0" indent="0" algn="l" defTabSz="914400" rtl="0" eaLnBrk="1" fontAlgn="auto" latinLnBrk="0" hangingPunct="1">
+              <a:lnSpc>
+                <a:spcPct val="100000"/>
+              </a:lnSpc>
+              <a:spcBef>
+                <a:spcPts val="0"/>
+              </a:spcBef>
+              <a:spcAft>
+                <a:spcPts val="0"/>
+              </a:spcAft>
+              <a:buClrTx/>
+              <a:buSzTx/>
+              <a:buFontTx/>
+              <a:buNone/>
+              <a:tabLst/>
+              <a:defRPr/>
+            </a:pPr>
+            <a:r>
+              <a:rPr lang="en-GB" dirty="0" smtClean="0"/>
+              <a:t>Tokenisation: </a:t>
+            </a:r>
+            <a:r>
+              <a:rPr lang="en-GB" dirty="0" smtClean="0">
+                <a:hlinkClick r:id="rId3"/>
+              </a:rPr>
+              <a:t>https://nlp.stanford.edu/IR-book/html/htmledition/tokenization-1.html</a:t>
+            </a:r>
+            <a:r>
+              <a:rPr lang="en-GB" dirty="0" smtClean="0"/>
+              <a:t> </a:t>
+            </a:r>
+          </a:p>
+          <a:p>
             <a:endParaRPr lang="en-GB" dirty="0"/>
           </a:p>
         </p:txBody>
@@ -3670,7 +3689,7 @@
     </p:spTree>
     <p:extLst>
       <p:ext uri="{BB962C8B-B14F-4D97-AF65-F5344CB8AC3E}">
-        <p14:creationId xmlns:p14="http://schemas.microsoft.com/office/powerpoint/2010/main" val="3382241340"/>
+        <p14:creationId xmlns:p14="http://schemas.microsoft.com/office/powerpoint/2010/main" val="1996164307"/>
       </p:ext>
     </p:extLst>
   </p:cSld>
@@ -3811,7 +3830,7 @@
           <a:p>
             <a:fld id="{4A474C15-5E11-4C39-AED3-324B356A19D4}" type="datetimeFigureOut">
               <a:rPr lang="en-GB" smtClean="0"/>
-              <a:t>14/04/2018</a:t>
+              <a:t>29/04/2018</a:t>
             </a:fld>
             <a:endParaRPr lang="en-GB"/>
           </a:p>
@@ -3988,7 +4007,7 @@
           <a:p>
             <a:fld id="{4A474C15-5E11-4C39-AED3-324B356A19D4}" type="datetimeFigureOut">
               <a:rPr lang="en-GB" smtClean="0"/>
-              <a:t>14/04/2018</a:t>
+              <a:t>29/04/2018</a:t>
             </a:fld>
             <a:endParaRPr lang="en-GB"/>
           </a:p>
@@ -4175,7 +4194,7 @@
           <a:p>
             <a:fld id="{4A474C15-5E11-4C39-AED3-324B356A19D4}" type="datetimeFigureOut">
               <a:rPr lang="en-GB" smtClean="0"/>
-              <a:t>14/04/2018</a:t>
+              <a:t>29/04/2018</a:t>
             </a:fld>
             <a:endParaRPr lang="en-GB"/>
           </a:p>
@@ -4362,7 +4381,7 @@
           <a:p>
             <a:fld id="{4A474C15-5E11-4C39-AED3-324B356A19D4}" type="datetimeFigureOut">
               <a:rPr lang="en-GB" smtClean="0"/>
-              <a:t>14/04/2018</a:t>
+              <a:t>29/04/2018</a:t>
             </a:fld>
             <a:endParaRPr lang="en-GB"/>
           </a:p>
@@ -4615,7 +4634,7 @@
           <a:p>
             <a:fld id="{4A474C15-5E11-4C39-AED3-324B356A19D4}" type="datetimeFigureOut">
               <a:rPr lang="en-GB" smtClean="0"/>
-              <a:t>14/04/2018</a:t>
+              <a:t>29/04/2018</a:t>
             </a:fld>
             <a:endParaRPr lang="en-GB"/>
           </a:p>
@@ -4859,7 +4878,7 @@
           <a:p>
             <a:fld id="{4A474C15-5E11-4C39-AED3-324B356A19D4}" type="datetimeFigureOut">
               <a:rPr lang="en-GB" smtClean="0"/>
-              <a:t>14/04/2018</a:t>
+              <a:t>29/04/2018</a:t>
             </a:fld>
             <a:endParaRPr lang="en-GB"/>
           </a:p>
@@ -5233,7 +5252,7 @@
           <a:p>
             <a:fld id="{4A474C15-5E11-4C39-AED3-324B356A19D4}" type="datetimeFigureOut">
               <a:rPr lang="en-GB" smtClean="0"/>
-              <a:t>14/04/2018</a:t>
+              <a:t>29/04/2018</a:t>
             </a:fld>
             <a:endParaRPr lang="en-GB"/>
           </a:p>
@@ -5358,7 +5377,7 @@
           <a:p>
             <a:fld id="{4A474C15-5E11-4C39-AED3-324B356A19D4}" type="datetimeFigureOut">
               <a:rPr lang="en-GB" smtClean="0"/>
-              <a:t>14/04/2018</a:t>
+              <a:t>29/04/2018</a:t>
             </a:fld>
             <a:endParaRPr lang="en-GB"/>
           </a:p>
@@ -5460,7 +5479,7 @@
           <a:p>
             <a:fld id="{4A474C15-5E11-4C39-AED3-324B356A19D4}" type="datetimeFigureOut">
               <a:rPr lang="en-GB" smtClean="0"/>
-              <a:t>14/04/2018</a:t>
+              <a:t>29/04/2018</a:t>
             </a:fld>
             <a:endParaRPr lang="en-GB"/>
           </a:p>
@@ -5744,7 +5763,7 @@
           <a:p>
             <a:fld id="{4A474C15-5E11-4C39-AED3-324B356A19D4}" type="datetimeFigureOut">
               <a:rPr lang="en-GB" smtClean="0"/>
-              <a:t>14/04/2018</a:t>
+              <a:t>29/04/2018</a:t>
             </a:fld>
             <a:endParaRPr lang="en-GB"/>
           </a:p>
@@ -6004,7 +6023,7 @@
           <a:p>
             <a:fld id="{4A474C15-5E11-4C39-AED3-324B356A19D4}" type="datetimeFigureOut">
               <a:rPr lang="en-GB" smtClean="0"/>
-              <a:t>14/04/2018</a:t>
+              <a:t>29/04/2018</a:t>
             </a:fld>
             <a:endParaRPr lang="en-GB"/>
           </a:p>
@@ -6224,7 +6243,7 @@
           <a:p>
             <a:fld id="{4A474C15-5E11-4C39-AED3-324B356A19D4}" type="datetimeFigureOut">
               <a:rPr lang="en-GB" smtClean="0"/>
-              <a:t>14/04/2018</a:t>
+              <a:t>29/04/2018</a:t>
             </a:fld>
             <a:endParaRPr lang="en-GB"/>
           </a:p>
@@ -6974,6 +6993,123 @@
           <a:p>
             <a:r>
               <a:rPr lang="en-GB" dirty="0" smtClean="0"/>
+              <a:t>What is a corpus?</a:t>
+            </a:r>
+            <a:endParaRPr lang="en-GB" dirty="0"/>
+          </a:p>
+        </p:txBody>
+      </p:sp>
+      <p:sp>
+        <p:nvSpPr>
+          <p:cNvPr id="3" name="Content Placeholder 2"/>
+          <p:cNvSpPr>
+            <a:spLocks noGrp="1"/>
+          </p:cNvSpPr>
+          <p:nvPr>
+            <p:ph idx="1"/>
+          </p:nvPr>
+        </p:nvSpPr>
+        <p:spPr/>
+        <p:txBody>
+          <a:bodyPr/>
+          <a:lstStyle/>
+          <a:p>
+            <a:r>
+              <a:rPr lang="en-GB" dirty="0"/>
+              <a:t>A collection of text data is called a </a:t>
+            </a:r>
+            <a:r>
+              <a:rPr lang="en-GB" dirty="0" smtClean="0"/>
+              <a:t>corpus</a:t>
+            </a:r>
+          </a:p>
+          <a:p>
+            <a:r>
+              <a:rPr lang="en-GB" dirty="0" smtClean="0"/>
+              <a:t>The corpus structure contains multiple text data (documents) and metadata</a:t>
+            </a:r>
+          </a:p>
+          <a:p>
+            <a:r>
+              <a:rPr lang="en-GB" dirty="0" smtClean="0"/>
+              <a:t>Often how data is extracted </a:t>
+            </a:r>
+            <a:r>
+              <a:rPr lang="en-GB" dirty="0" smtClean="0"/>
+              <a:t>(some R packages </a:t>
+            </a:r>
+            <a:r>
+              <a:rPr lang="en-GB" dirty="0" smtClean="0"/>
+              <a:t>contains data in corpus format</a:t>
+            </a:r>
+            <a:r>
+              <a:rPr lang="en-GB" dirty="0" smtClean="0"/>
+              <a:t>)</a:t>
+            </a:r>
+            <a:endParaRPr lang="en-GB" dirty="0" smtClean="0"/>
+          </a:p>
+          <a:p>
+            <a:endParaRPr lang="en-GB" dirty="0" smtClean="0"/>
+          </a:p>
+          <a:p>
+            <a:endParaRPr lang="en-GB" dirty="0"/>
+          </a:p>
+        </p:txBody>
+      </p:sp>
+    </p:spTree>
+    <p:extLst>
+      <p:ext uri="{BB962C8B-B14F-4D97-AF65-F5344CB8AC3E}">
+        <p14:creationId xmlns:p14="http://schemas.microsoft.com/office/powerpoint/2010/main" val="109616834"/>
+      </p:ext>
+    </p:extLst>
+  </p:cSld>
+  <p:clrMapOvr>
+    <a:masterClrMapping/>
+  </p:clrMapOvr>
+  <p:timing>
+    <p:tnLst>
+      <p:par>
+        <p:cTn id="1" dur="indefinite" restart="never" nodeType="tmRoot"/>
+      </p:par>
+    </p:tnLst>
+  </p:timing>
+</p:sld>
+</file>
+
+<file path=ppt/slides/slide12.xml><?xml version="1.0" encoding="utf-8"?>
+<p:sld xmlns:a="http://schemas.openxmlformats.org/drawingml/2006/main" xmlns:r="http://schemas.openxmlformats.org/officeDocument/2006/relationships" xmlns:p="http://schemas.openxmlformats.org/presentationml/2006/main">
+  <p:cSld>
+    <p:spTree>
+      <p:nvGrpSpPr>
+        <p:cNvPr id="1" name=""/>
+        <p:cNvGrpSpPr/>
+        <p:nvPr/>
+      </p:nvGrpSpPr>
+      <p:grpSpPr>
+        <a:xfrm>
+          <a:off x="0" y="0"/>
+          <a:ext cx="0" cy="0"/>
+          <a:chOff x="0" y="0"/>
+          <a:chExt cx="0" cy="0"/>
+        </a:xfrm>
+      </p:grpSpPr>
+      <p:sp>
+        <p:nvSpPr>
+          <p:cNvPr id="2" name="Title 1"/>
+          <p:cNvSpPr>
+            <a:spLocks noGrp="1"/>
+          </p:cNvSpPr>
+          <p:nvPr>
+            <p:ph type="title"/>
+          </p:nvPr>
+        </p:nvSpPr>
+        <p:spPr/>
+        <p:txBody>
+          <a:bodyPr/>
+          <a:lstStyle/>
+          <a:p>
+            <a:r>
+              <a:rPr lang="en-GB" dirty="0" smtClean="0"/>
               <a:t>What is tokenising?</a:t>
             </a:r>
             <a:endParaRPr lang="en-GB" dirty="0"/>
@@ -6997,11 +7133,7 @@
           <a:p>
             <a:r>
               <a:rPr lang="en-GB" dirty="0" smtClean="0"/>
-              <a:t>The </a:t>
-            </a:r>
-            <a:r>
-              <a:rPr lang="en-GB" dirty="0" smtClean="0"/>
-              <a:t>main features of text data are tokens</a:t>
+              <a:t>The main features of text data are tokens</a:t>
             </a:r>
           </a:p>
           <a:p>
@@ -7323,153 +7455,6 @@
 </p:sld>
 </file>
 
-<file path=ppt/slides/slide12.xml><?xml version="1.0" encoding="utf-8"?>
-<p:sld xmlns:a="http://schemas.openxmlformats.org/drawingml/2006/main" xmlns:r="http://schemas.openxmlformats.org/officeDocument/2006/relationships" xmlns:p="http://schemas.openxmlformats.org/presentationml/2006/main">
-  <p:cSld>
-    <p:spTree>
-      <p:nvGrpSpPr>
-        <p:cNvPr id="1" name=""/>
-        <p:cNvGrpSpPr/>
-        <p:nvPr/>
-      </p:nvGrpSpPr>
-      <p:grpSpPr>
-        <a:xfrm>
-          <a:off x="0" y="0"/>
-          <a:ext cx="0" cy="0"/>
-          <a:chOff x="0" y="0"/>
-          <a:chExt cx="0" cy="0"/>
-        </a:xfrm>
-      </p:grpSpPr>
-      <p:sp>
-        <p:nvSpPr>
-          <p:cNvPr id="2" name="Title 1"/>
-          <p:cNvSpPr>
-            <a:spLocks noGrp="1"/>
-          </p:cNvSpPr>
-          <p:nvPr>
-            <p:ph type="title"/>
-          </p:nvPr>
-        </p:nvSpPr>
-        <p:spPr/>
-        <p:txBody>
-          <a:bodyPr/>
-          <a:lstStyle/>
-          <a:p>
-            <a:r>
-              <a:rPr lang="en-GB" dirty="0" smtClean="0"/>
-              <a:t>How should I clean my data?</a:t>
-            </a:r>
-            <a:endParaRPr lang="en-GB" dirty="0"/>
-          </a:p>
-        </p:txBody>
-      </p:sp>
-      <p:sp>
-        <p:nvSpPr>
-          <p:cNvPr id="3" name="Content Placeholder 2"/>
-          <p:cNvSpPr>
-            <a:spLocks noGrp="1"/>
-          </p:cNvSpPr>
-          <p:nvPr>
-            <p:ph idx="1"/>
-          </p:nvPr>
-        </p:nvSpPr>
-        <p:spPr/>
-        <p:txBody>
-          <a:bodyPr/>
-          <a:lstStyle/>
-          <a:p>
-            <a:r>
-              <a:rPr lang="en-GB" dirty="0" smtClean="0"/>
-              <a:t>You can choose from many different options:</a:t>
-            </a:r>
-          </a:p>
-          <a:p>
-            <a:pPr lvl="1"/>
-            <a:r>
-              <a:rPr lang="en-GB" dirty="0" smtClean="0"/>
-              <a:t>Make all letters lower case</a:t>
-            </a:r>
-          </a:p>
-          <a:p>
-            <a:pPr lvl="1"/>
-            <a:r>
-              <a:rPr lang="en-GB" dirty="0" smtClean="0"/>
-              <a:t>Truncate words to the root of the word (stem)</a:t>
-            </a:r>
-          </a:p>
-          <a:p>
-            <a:pPr lvl="1"/>
-            <a:r>
-              <a:rPr lang="en-GB" dirty="0" smtClean="0"/>
-              <a:t>Remove small repetitive words (to)</a:t>
-            </a:r>
-          </a:p>
-          <a:p>
-            <a:pPr lvl="1"/>
-            <a:r>
-              <a:rPr lang="en-GB" dirty="0" smtClean="0"/>
-              <a:t>Remove punctuation</a:t>
-            </a:r>
-          </a:p>
-          <a:p>
-            <a:pPr lvl="1"/>
-            <a:r>
-              <a:rPr lang="en-GB" dirty="0" smtClean="0"/>
-              <a:t>Remove </a:t>
-            </a:r>
-            <a:r>
-              <a:rPr lang="en-GB" dirty="0" err="1" smtClean="0"/>
-              <a:t>urls</a:t>
-            </a:r>
-            <a:endParaRPr lang="en-GB" dirty="0" smtClean="0"/>
-          </a:p>
-          <a:p>
-            <a:pPr lvl="1"/>
-            <a:r>
-              <a:rPr lang="en-GB" dirty="0" smtClean="0"/>
-              <a:t>Remove repetitive words that don’t make sense</a:t>
-            </a:r>
-            <a:endParaRPr lang="en-GB" dirty="0" smtClean="0"/>
-          </a:p>
-          <a:p>
-            <a:pPr lvl="1"/>
-            <a:endParaRPr lang="en-GB" dirty="0" smtClean="0"/>
-          </a:p>
-          <a:p>
-            <a:pPr lvl="1"/>
-            <a:endParaRPr lang="en-GB" dirty="0"/>
-          </a:p>
-          <a:p>
-            <a:endParaRPr lang="en-GB" dirty="0"/>
-          </a:p>
-          <a:p>
-            <a:endParaRPr lang="en-GB" dirty="0" smtClean="0"/>
-          </a:p>
-          <a:p>
-            <a:endParaRPr lang="en-GB" dirty="0"/>
-          </a:p>
-        </p:txBody>
-      </p:sp>
-    </p:spTree>
-    <p:extLst>
-      <p:ext uri="{BB962C8B-B14F-4D97-AF65-F5344CB8AC3E}">
-        <p14:creationId xmlns:p14="http://schemas.microsoft.com/office/powerpoint/2010/main" val="2025769363"/>
-      </p:ext>
-    </p:extLst>
-  </p:cSld>
-  <p:clrMapOvr>
-    <a:masterClrMapping/>
-  </p:clrMapOvr>
-  <p:timing>
-    <p:tnLst>
-      <p:par>
-        <p:cTn id="1" dur="indefinite" restart="never" nodeType="tmRoot"/>
-      </p:par>
-    </p:tnLst>
-  </p:timing>
-</p:sld>
-</file>
-
 <file path=ppt/slides/slide13.xml><?xml version="1.0" encoding="utf-8"?>
 <p:sld xmlns:a="http://schemas.openxmlformats.org/drawingml/2006/main" xmlns:r="http://schemas.openxmlformats.org/officeDocument/2006/relationships" xmlns:p="http://schemas.openxmlformats.org/presentationml/2006/main">
   <p:cSld>
@@ -7504,135 +7489,6 @@
           <a:p>
             <a:r>
               <a:rPr lang="en-GB" dirty="0" smtClean="0"/>
-              <a:t>What is a corpus?</a:t>
-            </a:r>
-            <a:endParaRPr lang="en-GB" dirty="0"/>
-          </a:p>
-        </p:txBody>
-      </p:sp>
-      <p:sp>
-        <p:nvSpPr>
-          <p:cNvPr id="3" name="Content Placeholder 2"/>
-          <p:cNvSpPr>
-            <a:spLocks noGrp="1"/>
-          </p:cNvSpPr>
-          <p:nvPr>
-            <p:ph idx="1"/>
-          </p:nvPr>
-        </p:nvSpPr>
-        <p:spPr/>
-        <p:txBody>
-          <a:bodyPr/>
-          <a:lstStyle/>
-          <a:p>
-            <a:r>
-              <a:rPr lang="en-GB" dirty="0"/>
-              <a:t>A collection of text data is called a </a:t>
-            </a:r>
-            <a:r>
-              <a:rPr lang="en-GB" dirty="0" smtClean="0"/>
-              <a:t>corpus</a:t>
-            </a:r>
-            <a:endParaRPr lang="en-GB" dirty="0" smtClean="0"/>
-          </a:p>
-          <a:p>
-            <a:r>
-              <a:rPr lang="en-GB" dirty="0" smtClean="0"/>
-              <a:t>The corpus structure contains </a:t>
-            </a:r>
-            <a:r>
-              <a:rPr lang="en-GB" dirty="0" smtClean="0"/>
-              <a:t>multiple text data (documents) and metadata</a:t>
-            </a:r>
-          </a:p>
-          <a:p>
-            <a:r>
-              <a:rPr lang="en-GB" dirty="0" smtClean="0"/>
-              <a:t>Often how data is extracted (</a:t>
-            </a:r>
-            <a:r>
-              <a:rPr lang="en-GB" dirty="0" err="1" smtClean="0"/>
-              <a:t>quanteda</a:t>
-            </a:r>
-            <a:r>
-              <a:rPr lang="en-GB" dirty="0" smtClean="0"/>
-              <a:t> package contains data in corpus format)</a:t>
-            </a:r>
-          </a:p>
-          <a:p>
-            <a:endParaRPr lang="en-GB" dirty="0"/>
-          </a:p>
-          <a:p>
-            <a:r>
-              <a:rPr lang="en-GB" dirty="0" smtClean="0"/>
-              <a:t>Text cleaning is often applied on the corpus object</a:t>
-            </a:r>
-          </a:p>
-          <a:p>
-            <a:endParaRPr lang="en-GB" dirty="0" smtClean="0"/>
-          </a:p>
-          <a:p>
-            <a:endParaRPr lang="en-GB" dirty="0" smtClean="0"/>
-          </a:p>
-          <a:p>
-            <a:endParaRPr lang="en-GB" dirty="0"/>
-          </a:p>
-        </p:txBody>
-      </p:sp>
-    </p:spTree>
-    <p:extLst>
-      <p:ext uri="{BB962C8B-B14F-4D97-AF65-F5344CB8AC3E}">
-        <p14:creationId xmlns:p14="http://schemas.microsoft.com/office/powerpoint/2010/main" val="109616834"/>
-      </p:ext>
-    </p:extLst>
-  </p:cSld>
-  <p:clrMapOvr>
-    <a:masterClrMapping/>
-  </p:clrMapOvr>
-  <p:timing>
-    <p:tnLst>
-      <p:par>
-        <p:cTn id="1" dur="indefinite" restart="never" nodeType="tmRoot"/>
-      </p:par>
-    </p:tnLst>
-  </p:timing>
-</p:sld>
-</file>
-
-<file path=ppt/slides/slide14.xml><?xml version="1.0" encoding="utf-8"?>
-<p:sld xmlns:a="http://schemas.openxmlformats.org/drawingml/2006/main" xmlns:r="http://schemas.openxmlformats.org/officeDocument/2006/relationships" xmlns:p="http://schemas.openxmlformats.org/presentationml/2006/main">
-  <p:cSld>
-    <p:spTree>
-      <p:nvGrpSpPr>
-        <p:cNvPr id="1" name=""/>
-        <p:cNvGrpSpPr/>
-        <p:nvPr/>
-      </p:nvGrpSpPr>
-      <p:grpSpPr>
-        <a:xfrm>
-          <a:off x="0" y="0"/>
-          <a:ext cx="0" cy="0"/>
-          <a:chOff x="0" y="0"/>
-          <a:chExt cx="0" cy="0"/>
-        </a:xfrm>
-      </p:grpSpPr>
-      <p:sp>
-        <p:nvSpPr>
-          <p:cNvPr id="2" name="Title 1"/>
-          <p:cNvSpPr>
-            <a:spLocks noGrp="1"/>
-          </p:cNvSpPr>
-          <p:nvPr>
-            <p:ph type="title"/>
-          </p:nvPr>
-        </p:nvSpPr>
-        <p:spPr/>
-        <p:txBody>
-          <a:bodyPr/>
-          <a:lstStyle/>
-          <a:p>
-            <a:r>
-              <a:rPr lang="en-GB" dirty="0" smtClean="0"/>
               <a:t>What is a </a:t>
             </a:r>
             <a:r>
@@ -7670,13 +7526,8 @@
           <a:p>
             <a:r>
               <a:rPr lang="en-GB" dirty="0" smtClean="0"/>
-              <a:t>A </a:t>
-            </a:r>
-            <a:r>
-              <a:rPr lang="en-GB" dirty="0" smtClean="0"/>
-              <a:t>frequency table for each token per document </a:t>
-            </a:r>
-            <a:endParaRPr lang="en-GB" dirty="0" smtClean="0"/>
+              <a:t>A frequency table for each token per document </a:t>
+            </a:r>
           </a:p>
           <a:p>
             <a:endParaRPr lang="en-GB" dirty="0"/>
@@ -8001,7 +7852,7 @@
 </p:sld>
 </file>
 
-<file path=ppt/slides/slide15.xml><?xml version="1.0" encoding="utf-8"?>
+<file path=ppt/slides/slide14.xml><?xml version="1.0" encoding="utf-8"?>
 <p:sld xmlns:a="http://schemas.openxmlformats.org/drawingml/2006/main" xmlns:r="http://schemas.openxmlformats.org/officeDocument/2006/relationships" xmlns:p="http://schemas.openxmlformats.org/presentationml/2006/main">
   <p:cSld>
     <p:spTree>
@@ -8062,11 +7913,7 @@
             </a:r>
             <a:r>
               <a:rPr lang="en-GB" dirty="0" err="1" smtClean="0"/>
-              <a:t>dfm</a:t>
-            </a:r>
-            <a:r>
-              <a:rPr lang="en-GB" dirty="0" err="1" smtClean="0"/>
-              <a:t>s</a:t>
+              <a:t>dfms</a:t>
             </a:r>
             <a:r>
               <a:rPr lang="en-GB" dirty="0" smtClean="0"/>
@@ -8078,7 +7925,6 @@
               <a:rPr lang="en-GB" dirty="0" smtClean="0"/>
               <a:t>Sparse matrices can be treated as a normal matrix but are stored in a much more efficient way</a:t>
             </a:r>
-            <a:endParaRPr lang="en-GB" dirty="0" smtClean="0"/>
           </a:p>
           <a:p>
             <a:pPr lvl="1"/>
@@ -8109,7 +7955,7 @@
 </p:sld>
 </file>
 
-<file path=ppt/slides/slide16.xml><?xml version="1.0" encoding="utf-8"?>
+<file path=ppt/slides/slide15.xml><?xml version="1.0" encoding="utf-8"?>
 <p:sld xmlns:a="http://schemas.openxmlformats.org/drawingml/2006/main" xmlns:r="http://schemas.openxmlformats.org/officeDocument/2006/relationships" xmlns:p="http://schemas.openxmlformats.org/presentationml/2006/main">
   <p:cSld>
     <p:spTree>
@@ -9546,6 +9392,152 @@
 </p:sld>
 </file>
 
+<file path=ppt/slides/slide16.xml><?xml version="1.0" encoding="utf-8"?>
+<p:sld xmlns:a="http://schemas.openxmlformats.org/drawingml/2006/main" xmlns:r="http://schemas.openxmlformats.org/officeDocument/2006/relationships" xmlns:p="http://schemas.openxmlformats.org/presentationml/2006/main">
+  <p:cSld>
+    <p:spTree>
+      <p:nvGrpSpPr>
+        <p:cNvPr id="1" name=""/>
+        <p:cNvGrpSpPr/>
+        <p:nvPr/>
+      </p:nvGrpSpPr>
+      <p:grpSpPr>
+        <a:xfrm>
+          <a:off x="0" y="0"/>
+          <a:ext cx="0" cy="0"/>
+          <a:chOff x="0" y="0"/>
+          <a:chExt cx="0" cy="0"/>
+        </a:xfrm>
+      </p:grpSpPr>
+      <p:sp>
+        <p:nvSpPr>
+          <p:cNvPr id="2" name="Title 1"/>
+          <p:cNvSpPr>
+            <a:spLocks noGrp="1"/>
+          </p:cNvSpPr>
+          <p:nvPr>
+            <p:ph type="title"/>
+          </p:nvPr>
+        </p:nvSpPr>
+        <p:spPr/>
+        <p:txBody>
+          <a:bodyPr/>
+          <a:lstStyle/>
+          <a:p>
+            <a:r>
+              <a:rPr lang="en-GB" dirty="0" smtClean="0"/>
+              <a:t>How should I clean my data?</a:t>
+            </a:r>
+            <a:endParaRPr lang="en-GB" dirty="0"/>
+          </a:p>
+        </p:txBody>
+      </p:sp>
+      <p:sp>
+        <p:nvSpPr>
+          <p:cNvPr id="3" name="Content Placeholder 2"/>
+          <p:cNvSpPr>
+            <a:spLocks noGrp="1"/>
+          </p:cNvSpPr>
+          <p:nvPr>
+            <p:ph idx="1"/>
+          </p:nvPr>
+        </p:nvSpPr>
+        <p:spPr/>
+        <p:txBody>
+          <a:bodyPr/>
+          <a:lstStyle/>
+          <a:p>
+            <a:r>
+              <a:rPr lang="en-GB" dirty="0" smtClean="0"/>
+              <a:t>You can choose from many different options:</a:t>
+            </a:r>
+          </a:p>
+          <a:p>
+            <a:pPr lvl="1"/>
+            <a:r>
+              <a:rPr lang="en-GB" dirty="0" smtClean="0"/>
+              <a:t>Make all letters lower case</a:t>
+            </a:r>
+          </a:p>
+          <a:p>
+            <a:pPr lvl="1"/>
+            <a:r>
+              <a:rPr lang="en-GB" dirty="0" smtClean="0"/>
+              <a:t>Truncate words to the root of the word (stem)</a:t>
+            </a:r>
+          </a:p>
+          <a:p>
+            <a:pPr lvl="1"/>
+            <a:r>
+              <a:rPr lang="en-GB" dirty="0" smtClean="0"/>
+              <a:t>Remove small repetitive words (to)</a:t>
+            </a:r>
+          </a:p>
+          <a:p>
+            <a:pPr lvl="1"/>
+            <a:r>
+              <a:rPr lang="en-GB" dirty="0" smtClean="0"/>
+              <a:t>Remove punctuation</a:t>
+            </a:r>
+          </a:p>
+          <a:p>
+            <a:pPr lvl="1"/>
+            <a:r>
+              <a:rPr lang="en-GB" dirty="0" smtClean="0"/>
+              <a:t>Remove </a:t>
+            </a:r>
+            <a:r>
+              <a:rPr lang="en-GB" dirty="0" err="1" smtClean="0"/>
+              <a:t>urls</a:t>
+            </a:r>
+            <a:endParaRPr lang="en-GB" dirty="0" smtClean="0"/>
+          </a:p>
+          <a:p>
+            <a:pPr lvl="1"/>
+            <a:r>
+              <a:rPr lang="en-GB" dirty="0" smtClean="0"/>
+              <a:t>Remove repetitive words that don’t make sense</a:t>
+            </a:r>
+          </a:p>
+          <a:p>
+            <a:pPr lvl="1"/>
+            <a:endParaRPr lang="en-GB" dirty="0" smtClean="0"/>
+          </a:p>
+          <a:p>
+            <a:pPr lvl="1"/>
+            <a:endParaRPr lang="en-GB" dirty="0"/>
+          </a:p>
+          <a:p>
+            <a:endParaRPr lang="en-GB" dirty="0"/>
+          </a:p>
+          <a:p>
+            <a:endParaRPr lang="en-GB" dirty="0" smtClean="0"/>
+          </a:p>
+          <a:p>
+            <a:endParaRPr lang="en-GB" dirty="0"/>
+          </a:p>
+        </p:txBody>
+      </p:sp>
+    </p:spTree>
+    <p:extLst>
+      <p:ext uri="{BB962C8B-B14F-4D97-AF65-F5344CB8AC3E}">
+        <p14:creationId xmlns:p14="http://schemas.microsoft.com/office/powerpoint/2010/main" val="2025769363"/>
+      </p:ext>
+    </p:extLst>
+  </p:cSld>
+  <p:clrMapOvr>
+    <a:masterClrMapping/>
+  </p:clrMapOvr>
+  <p:timing>
+    <p:tnLst>
+      <p:par>
+        <p:cTn id="1" dur="indefinite" restart="never" nodeType="tmRoot"/>
+      </p:par>
+    </p:tnLst>
+  </p:timing>
+</p:sld>
+</file>
+
 <file path=ppt/slides/slide17.xml><?xml version="1.0" encoding="utf-8"?>
 <p:sld xmlns:a="http://schemas.openxmlformats.org/drawingml/2006/main" xmlns:r="http://schemas.openxmlformats.org/officeDocument/2006/relationships" xmlns:p="http://schemas.openxmlformats.org/presentationml/2006/main">
   <p:cSld>
@@ -9580,22 +9572,111 @@
           <a:p>
             <a:r>
               <a:rPr lang="en-GB" dirty="0" smtClean="0"/>
-              <a:t>Format </a:t>
-            </a:r>
-            <a:r>
-              <a:rPr lang="en-GB" dirty="0" smtClean="0"/>
-              <a:t>our data</a:t>
+              <a:t>What packages are available for text?</a:t>
+            </a:r>
+            <a:endParaRPr lang="en-GB" dirty="0"/>
+          </a:p>
+        </p:txBody>
+      </p:sp>
+      <p:sp>
+        <p:nvSpPr>
+          <p:cNvPr id="3" name="Content Placeholder 2"/>
+          <p:cNvSpPr>
+            <a:spLocks noGrp="1"/>
+          </p:cNvSpPr>
+          <p:nvPr>
+            <p:ph idx="1"/>
+          </p:nvPr>
+        </p:nvSpPr>
+        <p:spPr/>
+        <p:txBody>
+          <a:bodyPr/>
+          <a:lstStyle/>
+          <a:p>
+            <a:r>
+              <a:rPr lang="en-GB" dirty="0" err="1"/>
+              <a:t>t</a:t>
+            </a:r>
+            <a:r>
+              <a:rPr lang="en-GB" dirty="0" err="1" smtClean="0"/>
+              <a:t>idytext</a:t>
+            </a:r>
+            <a:endParaRPr lang="en-GB" dirty="0" smtClean="0"/>
+          </a:p>
+          <a:p>
+            <a:r>
+              <a:rPr lang="en-GB" dirty="0"/>
+              <a:t>t</a:t>
+            </a:r>
+            <a:r>
+              <a:rPr lang="en-GB" dirty="0" smtClean="0"/>
+              <a:t>m</a:t>
+            </a:r>
+          </a:p>
+          <a:p>
+            <a:r>
+              <a:rPr lang="en-GB" dirty="0" err="1" smtClean="0"/>
+              <a:t>quanteda</a:t>
+            </a:r>
+            <a:endParaRPr lang="en-GB" dirty="0"/>
+          </a:p>
+        </p:txBody>
+      </p:sp>
+    </p:spTree>
+    <p:extLst>
+      <p:ext uri="{BB962C8B-B14F-4D97-AF65-F5344CB8AC3E}">
+        <p14:creationId xmlns:p14="http://schemas.microsoft.com/office/powerpoint/2010/main" val="1929757458"/>
+      </p:ext>
+    </p:extLst>
+  </p:cSld>
+  <p:clrMapOvr>
+    <a:masterClrMapping/>
+  </p:clrMapOvr>
+</p:sld>
+</file>
+
+<file path=ppt/slides/slide18.xml><?xml version="1.0" encoding="utf-8"?>
+<p:sld xmlns:a="http://schemas.openxmlformats.org/drawingml/2006/main" xmlns:r="http://schemas.openxmlformats.org/officeDocument/2006/relationships" xmlns:p="http://schemas.openxmlformats.org/presentationml/2006/main">
+  <p:cSld>
+    <p:spTree>
+      <p:nvGrpSpPr>
+        <p:cNvPr id="1" name=""/>
+        <p:cNvGrpSpPr/>
+        <p:nvPr/>
+      </p:nvGrpSpPr>
+      <p:grpSpPr>
+        <a:xfrm>
+          <a:off x="0" y="0"/>
+          <a:ext cx="0" cy="0"/>
+          <a:chOff x="0" y="0"/>
+          <a:chExt cx="0" cy="0"/>
+        </a:xfrm>
+      </p:grpSpPr>
+      <p:sp>
+        <p:nvSpPr>
+          <p:cNvPr id="2" name="Title 1"/>
+          <p:cNvSpPr>
+            <a:spLocks noGrp="1"/>
+          </p:cNvSpPr>
+          <p:nvPr>
+            <p:ph type="title"/>
+          </p:nvPr>
+        </p:nvSpPr>
+        <p:spPr/>
+        <p:txBody>
+          <a:bodyPr/>
+          <a:lstStyle/>
+          <a:p>
+            <a:r>
+              <a:rPr lang="en-GB" dirty="0" smtClean="0"/>
+              <a:t>Format our data</a:t>
             </a:r>
             <a:br>
               <a:rPr lang="en-GB" dirty="0" smtClean="0"/>
             </a:br>
             <a:r>
               <a:rPr lang="en-GB" dirty="0" smtClean="0"/>
-              <a:t>More e</a:t>
-            </a:r>
-            <a:r>
-              <a:rPr lang="en-GB" dirty="0" smtClean="0"/>
-              <a:t>xploration</a:t>
+              <a:t>More exploration</a:t>
             </a:r>
             <a:endParaRPr lang="en-GB" dirty="0"/>
           </a:p>
@@ -9640,7 +9721,7 @@
 </p:sld>
 </file>
 
-<file path=ppt/slides/slide18.xml><?xml version="1.0" encoding="utf-8"?>
+<file path=ppt/slides/slide19.xml><?xml version="1.0" encoding="utf-8"?>
 <p:sld xmlns:a="http://schemas.openxmlformats.org/drawingml/2006/main" xmlns:r="http://schemas.openxmlformats.org/officeDocument/2006/relationships" xmlns:p="http://schemas.openxmlformats.org/presentationml/2006/main">
   <p:cSld>
     <p:spTree>
@@ -9813,7 +9894,182 @@
 </p:sld>
 </file>
 
-<file path=ppt/slides/slide19.xml><?xml version="1.0" encoding="utf-8"?>
+<file path=ppt/slides/slide2.xml><?xml version="1.0" encoding="utf-8"?>
+<p:sld xmlns:a="http://schemas.openxmlformats.org/drawingml/2006/main" xmlns:r="http://schemas.openxmlformats.org/officeDocument/2006/relationships" xmlns:p="http://schemas.openxmlformats.org/presentationml/2006/main">
+  <p:cSld>
+    <p:spTree>
+      <p:nvGrpSpPr>
+        <p:cNvPr id="1" name=""/>
+        <p:cNvGrpSpPr/>
+        <p:nvPr/>
+      </p:nvGrpSpPr>
+      <p:grpSpPr>
+        <a:xfrm>
+          <a:off x="0" y="0"/>
+          <a:ext cx="0" cy="0"/>
+          <a:chOff x="0" y="0"/>
+          <a:chExt cx="0" cy="0"/>
+        </a:xfrm>
+      </p:grpSpPr>
+      <p:sp>
+        <p:nvSpPr>
+          <p:cNvPr id="2" name="Title 1"/>
+          <p:cNvSpPr>
+            <a:spLocks noGrp="1"/>
+          </p:cNvSpPr>
+          <p:nvPr>
+            <p:ph type="title"/>
+          </p:nvPr>
+        </p:nvSpPr>
+        <p:spPr/>
+        <p:txBody>
+          <a:bodyPr/>
+          <a:lstStyle/>
+          <a:p>
+            <a:r>
+              <a:rPr lang="en-GB" dirty="0" smtClean="0"/>
+              <a:t>Prerequisites</a:t>
+            </a:r>
+            <a:endParaRPr lang="en-GB" dirty="0"/>
+          </a:p>
+        </p:txBody>
+      </p:sp>
+      <p:sp>
+        <p:nvSpPr>
+          <p:cNvPr id="3" name="Content Placeholder 2"/>
+          <p:cNvSpPr>
+            <a:spLocks noGrp="1"/>
+          </p:cNvSpPr>
+          <p:nvPr>
+            <p:ph idx="1"/>
+          </p:nvPr>
+        </p:nvSpPr>
+        <p:spPr/>
+        <p:txBody>
+          <a:bodyPr/>
+          <a:lstStyle/>
+          <a:p>
+            <a:r>
+              <a:rPr lang="en-GB" dirty="0" smtClean="0"/>
+              <a:t>Download the data from Kaggle </a:t>
+            </a:r>
+            <a:endParaRPr lang="en-GB" dirty="0"/>
+          </a:p>
+          <a:p>
+            <a:pPr marL="457200" lvl="1" indent="0">
+              <a:buNone/>
+            </a:pPr>
+            <a:r>
+              <a:rPr lang="en-GB" sz="2000" dirty="0" smtClean="0">
+                <a:hlinkClick r:id="rId3"/>
+              </a:rPr>
+              <a:t>https</a:t>
+            </a:r>
+            <a:r>
+              <a:rPr lang="en-GB" sz="2000" dirty="0">
+                <a:hlinkClick r:id="rId3"/>
+              </a:rPr>
+              <a:t>://www.kaggle.com/benhamner/clinton-trump-tweets/data#</a:t>
+            </a:r>
+            <a:r>
+              <a:rPr lang="en-GB" sz="2000" dirty="0"/>
+              <a:t> </a:t>
+            </a:r>
+            <a:endParaRPr lang="en-GB" sz="2000" dirty="0" smtClean="0"/>
+          </a:p>
+          <a:p>
+            <a:r>
+              <a:rPr lang="en-GB" dirty="0" smtClean="0"/>
+              <a:t>Have R &amp; </a:t>
+            </a:r>
+            <a:r>
+              <a:rPr lang="en-GB" dirty="0" err="1" smtClean="0"/>
+              <a:t>RStudio</a:t>
+            </a:r>
+            <a:r>
+              <a:rPr lang="en-GB" dirty="0" smtClean="0"/>
+              <a:t> installed (of course!)</a:t>
+            </a:r>
+          </a:p>
+          <a:p>
+            <a:r>
+              <a:rPr lang="en-GB" dirty="0" smtClean="0"/>
+              <a:t>Packages:</a:t>
+            </a:r>
+          </a:p>
+          <a:p>
+            <a:pPr lvl="1"/>
+            <a:r>
+              <a:rPr lang="en-GB" dirty="0" err="1" smtClean="0"/>
+              <a:t>Quanteda</a:t>
+            </a:r>
+            <a:endParaRPr lang="en-GB" dirty="0" smtClean="0"/>
+          </a:p>
+          <a:p>
+            <a:pPr lvl="1"/>
+            <a:r>
+              <a:rPr lang="en-GB" dirty="0" err="1" smtClean="0"/>
+              <a:t>Tidyverse</a:t>
+            </a:r>
+            <a:r>
+              <a:rPr lang="en-GB" dirty="0" smtClean="0"/>
+              <a:t> (</a:t>
+            </a:r>
+            <a:r>
+              <a:rPr lang="en-GB" dirty="0" err="1" smtClean="0"/>
+              <a:t>dplyr</a:t>
+            </a:r>
+            <a:r>
+              <a:rPr lang="en-GB" dirty="0" smtClean="0"/>
+              <a:t>, </a:t>
+            </a:r>
+            <a:r>
+              <a:rPr lang="en-GB" dirty="0" err="1" smtClean="0"/>
+              <a:t>ggplot</a:t>
+            </a:r>
+            <a:r>
+              <a:rPr lang="en-GB" dirty="0" smtClean="0"/>
+              <a:t>)</a:t>
+            </a:r>
+          </a:p>
+          <a:p>
+            <a:pPr lvl="1"/>
+            <a:r>
+              <a:rPr lang="en-GB" dirty="0" smtClean="0"/>
+              <a:t>Caret</a:t>
+            </a:r>
+          </a:p>
+          <a:p>
+            <a:pPr lvl="1"/>
+            <a:r>
+              <a:rPr lang="en-GB" dirty="0" smtClean="0"/>
+              <a:t>LIME</a:t>
+            </a:r>
+            <a:endParaRPr lang="en-GB" dirty="0"/>
+          </a:p>
+        </p:txBody>
+      </p:sp>
+    </p:spTree>
+    <p:extLst>
+      <p:ext uri="{BB962C8B-B14F-4D97-AF65-F5344CB8AC3E}">
+        <p14:creationId xmlns:p14="http://schemas.microsoft.com/office/powerpoint/2010/main" val="2647351230"/>
+      </p:ext>
+    </p:extLst>
+  </p:cSld>
+  <p:clrMapOvr>
+    <a:masterClrMapping/>
+  </p:clrMapOvr>
+  <p:timing>
+    <p:tnLst>
+      <p:par>
+        <p:cTn id="1" dur="indefinite" restart="never" nodeType="tmRoot"/>
+      </p:par>
+    </p:tnLst>
+  </p:timing>
+</p:sld>
+</file>
+
+<file path=ppt/slides/slide20.xml><?xml version="1.0" encoding="utf-8"?>
 <p:sld xmlns:a="http://schemas.openxmlformats.org/drawingml/2006/main" xmlns:r="http://schemas.openxmlformats.org/officeDocument/2006/relationships" xmlns:p="http://schemas.openxmlformats.org/presentationml/2006/main">
   <p:cSld>
     <p:spTree>
@@ -9926,7 +10182,7 @@
 </p:sld>
 </file>
 
-<file path=ppt/slides/slide2.xml><?xml version="1.0" encoding="utf-8"?>
+<file path=ppt/slides/slide21.xml><?xml version="1.0" encoding="utf-8"?>
 <p:sld xmlns:a="http://schemas.openxmlformats.org/drawingml/2006/main" xmlns:r="http://schemas.openxmlformats.org/officeDocument/2006/relationships" xmlns:p="http://schemas.openxmlformats.org/presentationml/2006/main">
   <p:cSld>
     <p:spTree>
@@ -9960,7 +10216,7 @@
           <a:p>
             <a:r>
               <a:rPr lang="en-GB" dirty="0" smtClean="0"/>
-              <a:t>Prerequisites</a:t>
+              <a:t>Build a classification model</a:t>
             </a:r>
             <a:endParaRPr lang="en-GB" dirty="0"/>
           </a:p>
@@ -9983,235 +10239,66 @@
           <a:p>
             <a:r>
               <a:rPr lang="en-GB" dirty="0" smtClean="0"/>
-              <a:t>Download the data from Kaggle </a:t>
-            </a:r>
-            <a:endParaRPr lang="en-GB" dirty="0"/>
-          </a:p>
-          <a:p>
-            <a:pPr marL="457200" lvl="1" indent="0">
-              <a:buNone/>
-            </a:pPr>
-            <a:r>
-              <a:rPr lang="en-GB" sz="2000" dirty="0" smtClean="0">
-                <a:hlinkClick r:id="rId3"/>
-              </a:rPr>
-              <a:t>https</a:t>
-            </a:r>
-            <a:r>
-              <a:rPr lang="en-GB" sz="2000" dirty="0">
-                <a:hlinkClick r:id="rId3"/>
-              </a:rPr>
-              <a:t>://www.kaggle.com/benhamner/clinton-trump-tweets/data#</a:t>
-            </a:r>
-            <a:r>
-              <a:rPr lang="en-GB" sz="2000" dirty="0"/>
-              <a:t> </a:t>
-            </a:r>
-            <a:endParaRPr lang="en-GB" sz="2000" dirty="0" smtClean="0"/>
-          </a:p>
-          <a:p>
-            <a:r>
-              <a:rPr lang="en-GB" dirty="0" smtClean="0"/>
-              <a:t>Have R </a:t>
-            </a:r>
-            <a:r>
-              <a:rPr lang="en-GB" dirty="0" smtClean="0"/>
-              <a:t>&amp; </a:t>
+              <a:t>We are going to use </a:t>
             </a:r>
             <a:r>
               <a:rPr lang="en-GB" dirty="0" err="1" smtClean="0"/>
-              <a:t>RStudio</a:t>
-            </a:r>
-            <a:r>
-              <a:rPr lang="en-GB" dirty="0" smtClean="0"/>
-              <a:t> </a:t>
-            </a:r>
-            <a:r>
-              <a:rPr lang="en-GB" dirty="0" smtClean="0"/>
-              <a:t>installed (of </a:t>
-            </a:r>
-            <a:r>
-              <a:rPr lang="en-GB" dirty="0" smtClean="0"/>
-              <a:t>course!)</a:t>
-            </a:r>
-          </a:p>
-          <a:p>
-            <a:r>
-              <a:rPr lang="en-GB" dirty="0" smtClean="0"/>
-              <a:t>Packages:</a:t>
+              <a:t>glmnet</a:t>
+            </a:r>
+            <a:r>
+              <a:rPr lang="en-GB" dirty="0" smtClean="0"/>
+              <a:t> in the workshop </a:t>
             </a:r>
           </a:p>
           <a:p>
             <a:pPr lvl="1"/>
             <a:r>
-              <a:rPr lang="en-GB" dirty="0" err="1" smtClean="0"/>
-              <a:t>Quanteda</a:t>
+              <a:rPr lang="en-GB" dirty="0" smtClean="0"/>
+              <a:t>Would normally </a:t>
+            </a:r>
+            <a:r>
+              <a:rPr lang="en-GB" dirty="0" smtClean="0"/>
+              <a:t>use </a:t>
+            </a:r>
+            <a:r>
+              <a:rPr lang="en-GB" dirty="0" smtClean="0"/>
+              <a:t>CARET or H20ML for flexibility</a:t>
             </a:r>
             <a:endParaRPr lang="en-GB" dirty="0" smtClean="0"/>
           </a:p>
           <a:p>
+            <a:r>
+              <a:rPr lang="en-GB" dirty="0" smtClean="0"/>
+              <a:t>Normal data science workflow</a:t>
+            </a:r>
+          </a:p>
+          <a:p>
             <a:pPr lvl="1"/>
             <a:r>
-              <a:rPr lang="en-GB" dirty="0" err="1" smtClean="0"/>
-              <a:t>Tidyverse</a:t>
-            </a:r>
-            <a:r>
-              <a:rPr lang="en-GB" dirty="0" smtClean="0"/>
-              <a:t> (</a:t>
-            </a:r>
-            <a:r>
-              <a:rPr lang="en-GB" dirty="0" err="1" smtClean="0"/>
-              <a:t>dplyr</a:t>
-            </a:r>
-            <a:r>
-              <a:rPr lang="en-GB" dirty="0" smtClean="0"/>
-              <a:t>, </a:t>
-            </a:r>
-            <a:r>
-              <a:rPr lang="en-GB" dirty="0" err="1" smtClean="0"/>
-              <a:t>ggplot</a:t>
-            </a:r>
-            <a:r>
-              <a:rPr lang="en-GB" dirty="0" smtClean="0"/>
-              <a:t>)</a:t>
+              <a:rPr lang="en-GB" dirty="0" smtClean="0"/>
+              <a:t>Split train/test</a:t>
             </a:r>
           </a:p>
           <a:p>
             <a:pPr lvl="1"/>
             <a:r>
               <a:rPr lang="en-GB" dirty="0" smtClean="0"/>
-              <a:t>Caret</a:t>
+              <a:t>Feature engineering</a:t>
             </a:r>
           </a:p>
           <a:p>
             <a:pPr lvl="1"/>
             <a:r>
               <a:rPr lang="en-GB" dirty="0" smtClean="0"/>
-              <a:t>LIME</a:t>
-            </a:r>
-            <a:endParaRPr lang="en-GB" dirty="0"/>
-          </a:p>
-        </p:txBody>
-      </p:sp>
-    </p:spTree>
-    <p:extLst>
-      <p:ext uri="{BB962C8B-B14F-4D97-AF65-F5344CB8AC3E}">
-        <p14:creationId xmlns:p14="http://schemas.microsoft.com/office/powerpoint/2010/main" val="2647351230"/>
-      </p:ext>
-    </p:extLst>
-  </p:cSld>
-  <p:clrMapOvr>
-    <a:masterClrMapping/>
-  </p:clrMapOvr>
-  <p:timing>
-    <p:tnLst>
-      <p:par>
-        <p:cTn id="1" dur="indefinite" restart="never" nodeType="tmRoot"/>
-      </p:par>
-    </p:tnLst>
-  </p:timing>
-</p:sld>
-</file>
-
-<file path=ppt/slides/slide20.xml><?xml version="1.0" encoding="utf-8"?>
-<p:sld xmlns:a="http://schemas.openxmlformats.org/drawingml/2006/main" xmlns:r="http://schemas.openxmlformats.org/officeDocument/2006/relationships" xmlns:p="http://schemas.openxmlformats.org/presentationml/2006/main">
-  <p:cSld>
-    <p:spTree>
-      <p:nvGrpSpPr>
-        <p:cNvPr id="1" name=""/>
-        <p:cNvGrpSpPr/>
-        <p:nvPr/>
-      </p:nvGrpSpPr>
-      <p:grpSpPr>
-        <a:xfrm>
-          <a:off x="0" y="0"/>
-          <a:ext cx="0" cy="0"/>
-          <a:chOff x="0" y="0"/>
-          <a:chExt cx="0" cy="0"/>
-        </a:xfrm>
-      </p:grpSpPr>
-      <p:sp>
-        <p:nvSpPr>
-          <p:cNvPr id="2" name="Title 1"/>
-          <p:cNvSpPr>
-            <a:spLocks noGrp="1"/>
-          </p:cNvSpPr>
-          <p:nvPr>
-            <p:ph type="title"/>
-          </p:nvPr>
-        </p:nvSpPr>
-        <p:spPr/>
-        <p:txBody>
-          <a:bodyPr/>
-          <a:lstStyle/>
-          <a:p>
-            <a:r>
-              <a:rPr lang="en-GB" dirty="0" smtClean="0"/>
-              <a:t>Build a classification model</a:t>
-            </a:r>
-            <a:endParaRPr lang="en-GB" dirty="0"/>
-          </a:p>
-        </p:txBody>
-      </p:sp>
-      <p:sp>
-        <p:nvSpPr>
-          <p:cNvPr id="3" name="Content Placeholder 2"/>
-          <p:cNvSpPr>
-            <a:spLocks noGrp="1"/>
-          </p:cNvSpPr>
-          <p:nvPr>
-            <p:ph idx="1"/>
-          </p:nvPr>
-        </p:nvSpPr>
-        <p:spPr/>
-        <p:txBody>
-          <a:bodyPr/>
-          <a:lstStyle/>
-          <a:p>
-            <a:r>
-              <a:rPr lang="en-GB" dirty="0" smtClean="0"/>
-              <a:t>We are going to use </a:t>
-            </a:r>
-            <a:r>
-              <a:rPr lang="en-GB" dirty="0" smtClean="0"/>
-              <a:t>CARET (&amp;/or H20)</a:t>
-            </a:r>
-            <a:endParaRPr lang="en-GB" dirty="0" smtClean="0"/>
-          </a:p>
-          <a:p>
-            <a:r>
-              <a:rPr lang="en-GB" dirty="0" smtClean="0"/>
-              <a:t>Normal data science workflow</a:t>
+              <a:t>Fit models</a:t>
             </a:r>
           </a:p>
           <a:p>
             <a:pPr lvl="1"/>
             <a:r>
               <a:rPr lang="en-GB" dirty="0" smtClean="0"/>
-              <a:t>Split train/test</a:t>
-            </a:r>
-          </a:p>
-          <a:p>
-            <a:pPr lvl="1"/>
-            <a:r>
-              <a:rPr lang="en-GB" dirty="0" smtClean="0"/>
-              <a:t>Feature engineering</a:t>
-            </a:r>
-          </a:p>
-          <a:p>
-            <a:pPr lvl="1"/>
-            <a:r>
-              <a:rPr lang="en-GB" dirty="0" smtClean="0"/>
-              <a:t>Fit models</a:t>
-            </a:r>
-          </a:p>
-          <a:p>
-            <a:pPr lvl="1"/>
-            <a:r>
-              <a:rPr lang="en-GB" dirty="0" smtClean="0"/>
               <a:t>Predict &amp; evaluate</a:t>
             </a:r>
-            <a:endParaRPr lang="en-GB" dirty="0" smtClean="0"/>
           </a:p>
           <a:p>
             <a:endParaRPr lang="en-GB" dirty="0"/>
@@ -10238,7 +10325,7 @@
 </p:sld>
 </file>
 
-<file path=ppt/slides/slide21.xml><?xml version="1.0" encoding="utf-8"?>
+<file path=ppt/slides/slide22.xml><?xml version="1.0" encoding="utf-8"?>
 <p:sld xmlns:a="http://schemas.openxmlformats.org/drawingml/2006/main" xmlns:r="http://schemas.openxmlformats.org/officeDocument/2006/relationships" xmlns:p="http://schemas.openxmlformats.org/presentationml/2006/main">
   <p:cSld>
     <p:spTree>
@@ -10286,11 +10373,7 @@
             </a:br>
             <a:r>
               <a:rPr lang="en-GB" dirty="0" smtClean="0"/>
-              <a:t>Fit models, predict </a:t>
-            </a:r>
-            <a:r>
-              <a:rPr lang="en-GB" dirty="0" smtClean="0"/>
-              <a:t>&amp; evaluate</a:t>
+              <a:t>Fit models, predict &amp; evaluate</a:t>
             </a:r>
             <a:endParaRPr lang="en-GB" dirty="0"/>
           </a:p>
@@ -10335,7 +10418,7 @@
 </p:sld>
 </file>
 
-<file path=ppt/slides/slide22.xml><?xml version="1.0" encoding="utf-8"?>
+<file path=ppt/slides/slide23.xml><?xml version="1.0" encoding="utf-8"?>
 <p:sld xmlns:a="http://schemas.openxmlformats.org/drawingml/2006/main" xmlns:r="http://schemas.openxmlformats.org/officeDocument/2006/relationships" xmlns:p="http://schemas.openxmlformats.org/presentationml/2006/main">
   <p:cSld>
     <p:spTree>
@@ -10568,7 +10651,7 @@
 </p:sld>
 </file>
 
-<file path=ppt/slides/slide23.xml><?xml version="1.0" encoding="utf-8"?>
+<file path=ppt/slides/slide24.xml><?xml version="1.0" encoding="utf-8"?>
 <p:sld xmlns:a="http://schemas.openxmlformats.org/drawingml/2006/main" xmlns:r="http://schemas.openxmlformats.org/officeDocument/2006/relationships" xmlns:p="http://schemas.openxmlformats.org/presentationml/2006/main">
   <p:cSld>
     <p:spTree>
@@ -10681,7 +10764,7 @@
 </p:sld>
 </file>
 
-<file path=ppt/slides/slide24.xml><?xml version="1.0" encoding="utf-8"?>
+<file path=ppt/slides/slide25.xml><?xml version="1.0" encoding="utf-8"?>
 <p:sld xmlns:a="http://schemas.openxmlformats.org/drawingml/2006/main" xmlns:r="http://schemas.openxmlformats.org/officeDocument/2006/relationships" xmlns:p="http://schemas.openxmlformats.org/presentationml/2006/main">
   <p:cSld>
     <p:spTree>
@@ -10812,7 +10895,7 @@
 </p:sld>
 </file>
 
-<file path=ppt/slides/slide25.xml><?xml version="1.0" encoding="utf-8"?>
+<file path=ppt/slides/slide26.xml><?xml version="1.0" encoding="utf-8"?>
 <p:sld xmlns:a="http://schemas.openxmlformats.org/drawingml/2006/main" xmlns:r="http://schemas.openxmlformats.org/officeDocument/2006/relationships" xmlns:p="http://schemas.openxmlformats.org/presentationml/2006/main">
   <p:cSld>
     <p:spTree>
@@ -10930,7 +11013,7 @@
 </p:sld>
 </file>
 
-<file path=ppt/slides/slide26.xml><?xml version="1.0" encoding="utf-8"?>
+<file path=ppt/slides/slide27.xml><?xml version="1.0" encoding="utf-8"?>
 <p:sld xmlns:a="http://schemas.openxmlformats.org/drawingml/2006/main" xmlns:r="http://schemas.openxmlformats.org/officeDocument/2006/relationships" xmlns:p="http://schemas.openxmlformats.org/presentationml/2006/main">
   <p:cSld>
     <p:spTree>
@@ -11043,7 +11126,7 @@
 </p:sld>
 </file>
 
-<file path=ppt/slides/slide27.xml><?xml version="1.0" encoding="utf-8"?>
+<file path=ppt/slides/slide28.xml><?xml version="1.0" encoding="utf-8"?>
 <p:sld xmlns:a="http://schemas.openxmlformats.org/drawingml/2006/main" xmlns:r="http://schemas.openxmlformats.org/officeDocument/2006/relationships" xmlns:p="http://schemas.openxmlformats.org/presentationml/2006/main">
   <p:cSld>
     <p:spTree>
@@ -11156,154 +11239,6 @@
 </p:sld>
 </file>
 
-<file path=ppt/slides/slide28.xml><?xml version="1.0" encoding="utf-8"?>
-<p:sld xmlns:a="http://schemas.openxmlformats.org/drawingml/2006/main" xmlns:r="http://schemas.openxmlformats.org/officeDocument/2006/relationships" xmlns:p="http://schemas.openxmlformats.org/presentationml/2006/main">
-  <p:cSld>
-    <p:spTree>
-      <p:nvGrpSpPr>
-        <p:cNvPr id="1" name=""/>
-        <p:cNvGrpSpPr/>
-        <p:nvPr/>
-      </p:nvGrpSpPr>
-      <p:grpSpPr>
-        <a:xfrm>
-          <a:off x="0" y="0"/>
-          <a:ext cx="0" cy="0"/>
-          <a:chOff x="0" y="0"/>
-          <a:chExt cx="0" cy="0"/>
-        </a:xfrm>
-      </p:grpSpPr>
-      <p:sp>
-        <p:nvSpPr>
-          <p:cNvPr id="2" name="Title 1"/>
-          <p:cNvSpPr>
-            <a:spLocks noGrp="1"/>
-          </p:cNvSpPr>
-          <p:nvPr>
-            <p:ph type="title"/>
-          </p:nvPr>
-        </p:nvSpPr>
-        <p:spPr/>
-        <p:txBody>
-          <a:bodyPr/>
-          <a:lstStyle/>
-          <a:p>
-            <a:r>
-              <a:rPr lang="en-GB" dirty="0" smtClean="0"/>
-              <a:t>It’s all about </a:t>
-            </a:r>
-            <a:r>
-              <a:rPr lang="en-GB" u="sng" dirty="0" smtClean="0"/>
-              <a:t>trust</a:t>
-            </a:r>
-            <a:endParaRPr lang="en-GB" u="sng" dirty="0"/>
-          </a:p>
-        </p:txBody>
-      </p:sp>
-      <p:sp>
-        <p:nvSpPr>
-          <p:cNvPr id="3" name="Content Placeholder 2"/>
-          <p:cNvSpPr>
-            <a:spLocks noGrp="1"/>
-          </p:cNvSpPr>
-          <p:nvPr>
-            <p:ph idx="1"/>
-          </p:nvPr>
-        </p:nvSpPr>
-        <p:spPr/>
-        <p:txBody>
-          <a:bodyPr/>
-          <a:lstStyle/>
-          <a:p>
-            <a:r>
-              <a:rPr lang="en-GB" dirty="0" smtClean="0"/>
-              <a:t>Should </a:t>
-            </a:r>
-            <a:r>
-              <a:rPr lang="en-GB" dirty="0" smtClean="0"/>
-              <a:t>I trust the results of this prediction and take action?</a:t>
-            </a:r>
-          </a:p>
-          <a:p>
-            <a:pPr lvl="1"/>
-            <a:r>
-              <a:rPr lang="en-GB" dirty="0" smtClean="0"/>
-              <a:t>Cancer diagnosis, movie </a:t>
-            </a:r>
-            <a:r>
-              <a:rPr lang="en-GB" dirty="0" smtClean="0"/>
-              <a:t>recommendations</a:t>
-            </a:r>
-          </a:p>
-          <a:p>
-            <a:r>
-              <a:rPr lang="en-GB" dirty="0" smtClean="0"/>
-              <a:t>Will the results give </a:t>
-            </a:r>
-            <a:r>
-              <a:rPr lang="en-GB" dirty="0" smtClean="0"/>
-              <a:t>me my desired </a:t>
-            </a:r>
-            <a:r>
-              <a:rPr lang="en-GB" dirty="0" smtClean="0"/>
-              <a:t>effect?</a:t>
-            </a:r>
-            <a:endParaRPr lang="en-GB" dirty="0" smtClean="0"/>
-          </a:p>
-          <a:p>
-            <a:pPr lvl="1"/>
-            <a:r>
-              <a:rPr lang="en-GB" dirty="0" smtClean="0"/>
-              <a:t>High propensity for users to read “click-bait” type ads, but will that actually </a:t>
-            </a:r>
-            <a:r>
-              <a:rPr lang="en-GB" dirty="0" smtClean="0"/>
-              <a:t>be </a:t>
-            </a:r>
-            <a:r>
-              <a:rPr lang="en-GB" dirty="0" smtClean="0"/>
-              <a:t>detrimental to long term goals</a:t>
-            </a:r>
-            <a:r>
-              <a:rPr lang="en-GB" dirty="0" smtClean="0"/>
-              <a:t>?</a:t>
-            </a:r>
-          </a:p>
-          <a:p>
-            <a:r>
-              <a:rPr lang="en-GB" dirty="0" smtClean="0"/>
-              <a:t>Will my model work “in the wild”?</a:t>
-            </a:r>
-            <a:endParaRPr lang="en-GB" dirty="0"/>
-          </a:p>
-          <a:p>
-            <a:r>
-              <a:rPr lang="en-GB" dirty="0" smtClean="0"/>
-              <a:t>Which model should I choose?</a:t>
-            </a:r>
-          </a:p>
-        </p:txBody>
-      </p:sp>
-    </p:spTree>
-    <p:extLst>
-      <p:ext uri="{BB962C8B-B14F-4D97-AF65-F5344CB8AC3E}">
-        <p14:creationId xmlns:p14="http://schemas.microsoft.com/office/powerpoint/2010/main" val="1851339849"/>
-      </p:ext>
-    </p:extLst>
-  </p:cSld>
-  <p:clrMapOvr>
-    <a:masterClrMapping/>
-  </p:clrMapOvr>
-  <p:timing>
-    <p:tnLst>
-      <p:par>
-        <p:cTn id="1" dur="indefinite" restart="never" nodeType="tmRoot"/>
-      </p:par>
-    </p:tnLst>
-  </p:timing>
-</p:sld>
-</file>
-
 <file path=ppt/slides/slide29.xml><?xml version="1.0" encoding="utf-8"?>
 <p:sld xmlns:a="http://schemas.openxmlformats.org/drawingml/2006/main" xmlns:r="http://schemas.openxmlformats.org/officeDocument/2006/relationships" xmlns:p="http://schemas.openxmlformats.org/presentationml/2006/main">
   <p:cSld>
@@ -11338,88 +11273,75 @@
           <a:p>
             <a:r>
               <a:rPr lang="en-GB" dirty="0" smtClean="0"/>
-              <a:t>What is LIME?</a:t>
+              <a:t>It’s all about </a:t>
+            </a:r>
+            <a:r>
+              <a:rPr lang="en-GB" u="sng" dirty="0" smtClean="0"/>
+              <a:t>trust</a:t>
+            </a:r>
+            <a:endParaRPr lang="en-GB" u="sng" dirty="0"/>
+          </a:p>
+        </p:txBody>
+      </p:sp>
+      <p:sp>
+        <p:nvSpPr>
+          <p:cNvPr id="3" name="Content Placeholder 2"/>
+          <p:cNvSpPr>
+            <a:spLocks noGrp="1"/>
+          </p:cNvSpPr>
+          <p:nvPr>
+            <p:ph idx="1"/>
+          </p:nvPr>
+        </p:nvSpPr>
+        <p:spPr/>
+        <p:txBody>
+          <a:bodyPr/>
+          <a:lstStyle/>
+          <a:p>
+            <a:r>
+              <a:rPr lang="en-GB" dirty="0" smtClean="0"/>
+              <a:t>Should I trust the results of this prediction and take action?</a:t>
+            </a:r>
+          </a:p>
+          <a:p>
+            <a:pPr lvl="1"/>
+            <a:r>
+              <a:rPr lang="en-GB" dirty="0" smtClean="0"/>
+              <a:t>Cancer diagnosis, movie recommendations</a:t>
+            </a:r>
+          </a:p>
+          <a:p>
+            <a:r>
+              <a:rPr lang="en-GB" dirty="0" smtClean="0"/>
+              <a:t>Will the results give me my desired effect?</a:t>
+            </a:r>
+          </a:p>
+          <a:p>
+            <a:pPr lvl="1"/>
+            <a:r>
+              <a:rPr lang="en-GB" dirty="0" smtClean="0"/>
+              <a:t>High propensity for users to read “click-bait” type ads, but will that actually be detrimental to long term goals?</a:t>
+            </a:r>
+          </a:p>
+          <a:p>
+            <a:r>
+              <a:rPr lang="en-GB" dirty="0" smtClean="0"/>
+              <a:t>Will my model work “in the wild”?</a:t>
             </a:r>
             <a:endParaRPr lang="en-GB" dirty="0"/>
           </a:p>
-        </p:txBody>
-      </p:sp>
-      <p:sp>
-        <p:nvSpPr>
-          <p:cNvPr id="3" name="Content Placeholder 2"/>
-          <p:cNvSpPr>
-            <a:spLocks noGrp="1"/>
-          </p:cNvSpPr>
-          <p:nvPr>
-            <p:ph idx="1"/>
-          </p:nvPr>
-        </p:nvSpPr>
-        <p:spPr/>
-        <p:txBody>
-          <a:bodyPr/>
-          <a:lstStyle/>
-          <a:p>
-            <a:r>
-              <a:rPr lang="en-GB" i="1" dirty="0" smtClean="0"/>
-              <a:t>Local</a:t>
-            </a:r>
-            <a:r>
-              <a:rPr lang="en-GB" dirty="0" smtClean="0"/>
-              <a:t> – describes drivers for local areas, not globally</a:t>
-            </a:r>
-            <a:endParaRPr lang="en-GB" i="1" dirty="0" smtClean="0"/>
-          </a:p>
-          <a:p>
-            <a:r>
-              <a:rPr lang="en-GB" i="1" dirty="0" smtClean="0"/>
-              <a:t>Interpretable</a:t>
-            </a:r>
-            <a:r>
-              <a:rPr lang="en-GB" dirty="0" smtClean="0"/>
-              <a:t> – results are understandable to normal people</a:t>
-            </a:r>
-            <a:endParaRPr lang="en-GB" i="1" dirty="0" smtClean="0"/>
-          </a:p>
-          <a:p>
-            <a:r>
-              <a:rPr lang="en-GB" i="1" dirty="0" smtClean="0"/>
-              <a:t>Model-agnostic</a:t>
-            </a:r>
-            <a:r>
-              <a:rPr lang="en-GB" dirty="0" smtClean="0"/>
-              <a:t> – works on all models, treated as black-box</a:t>
-            </a:r>
-            <a:endParaRPr lang="en-GB" i="1" dirty="0" smtClean="0"/>
-          </a:p>
-          <a:p>
-            <a:r>
-              <a:rPr lang="en-GB" i="1" dirty="0" smtClean="0"/>
-              <a:t>Explanations</a:t>
-            </a:r>
-            <a:r>
-              <a:rPr lang="en-GB" dirty="0" smtClean="0"/>
-              <a:t> – shows the drivers of the model predictions</a:t>
-            </a:r>
-          </a:p>
-          <a:p>
-            <a:endParaRPr lang="en-GB" i="1" dirty="0" smtClean="0"/>
-          </a:p>
-          <a:p>
-            <a:r>
-              <a:rPr lang="en-GB" dirty="0" smtClean="0"/>
-              <a:t>Can be used on text, images and numerical data</a:t>
-            </a:r>
-            <a:endParaRPr lang="en-GB" dirty="0"/>
-          </a:p>
-          <a:p>
-            <a:endParaRPr lang="en-GB" dirty="0"/>
+          <a:p>
+            <a:r>
+              <a:rPr lang="en-GB" dirty="0" smtClean="0"/>
+              <a:t>Which model should I choose?</a:t>
+            </a:r>
           </a:p>
         </p:txBody>
       </p:sp>
     </p:spTree>
     <p:extLst>
       <p:ext uri="{BB962C8B-B14F-4D97-AF65-F5344CB8AC3E}">
-        <p14:creationId xmlns:p14="http://schemas.microsoft.com/office/powerpoint/2010/main" val="581693999"/>
+        <p14:creationId xmlns:p14="http://schemas.microsoft.com/office/powerpoint/2010/main" val="1851339849"/>
       </p:ext>
     </p:extLst>
   </p:cSld>
@@ -11545,7 +11467,6 @@
               <a:rPr lang="en-GB" dirty="0" smtClean="0"/>
               <a:t> uses NLP and customer focused ML to personalise the insurance market at Aviva</a:t>
             </a:r>
-            <a:endParaRPr lang="en-GB" dirty="0" smtClean="0"/>
           </a:p>
           <a:p>
             <a:pPr marL="0" indent="0">
@@ -11618,15 +11539,7 @@
             </a:pPr>
             <a:r>
               <a:rPr lang="en-GB" dirty="0" smtClean="0"/>
-              <a:t>Grace is exploring the use of R </a:t>
-            </a:r>
-            <a:r>
-              <a:rPr lang="en-GB" dirty="0" smtClean="0"/>
-              <a:t>&amp; ML in </a:t>
-            </a:r>
-            <a:r>
-              <a:rPr lang="en-GB" dirty="0" smtClean="0"/>
-              <a:t>economics at Oxera Consulting</a:t>
+              <a:t>Grace is exploring the use of R &amp; ML in economics at Oxera Consulting</a:t>
             </a:r>
             <a:endParaRPr lang="en-GB" dirty="0"/>
           </a:p>
@@ -11751,6 +11664,138 @@
       </p:grpSpPr>
       <p:sp>
         <p:nvSpPr>
+          <p:cNvPr id="2" name="Title 1"/>
+          <p:cNvSpPr>
+            <a:spLocks noGrp="1"/>
+          </p:cNvSpPr>
+          <p:nvPr>
+            <p:ph type="title"/>
+          </p:nvPr>
+        </p:nvSpPr>
+        <p:spPr/>
+        <p:txBody>
+          <a:bodyPr/>
+          <a:lstStyle/>
+          <a:p>
+            <a:r>
+              <a:rPr lang="en-GB" dirty="0" smtClean="0"/>
+              <a:t>What is LIME?</a:t>
+            </a:r>
+            <a:endParaRPr lang="en-GB" dirty="0"/>
+          </a:p>
+        </p:txBody>
+      </p:sp>
+      <p:sp>
+        <p:nvSpPr>
+          <p:cNvPr id="3" name="Content Placeholder 2"/>
+          <p:cNvSpPr>
+            <a:spLocks noGrp="1"/>
+          </p:cNvSpPr>
+          <p:nvPr>
+            <p:ph idx="1"/>
+          </p:nvPr>
+        </p:nvSpPr>
+        <p:spPr/>
+        <p:txBody>
+          <a:bodyPr/>
+          <a:lstStyle/>
+          <a:p>
+            <a:r>
+              <a:rPr lang="en-GB" i="1" dirty="0" smtClean="0"/>
+              <a:t>Local</a:t>
+            </a:r>
+            <a:r>
+              <a:rPr lang="en-GB" dirty="0" smtClean="0"/>
+              <a:t> – describes drivers for local areas, not globally</a:t>
+            </a:r>
+            <a:endParaRPr lang="en-GB" i="1" dirty="0" smtClean="0"/>
+          </a:p>
+          <a:p>
+            <a:r>
+              <a:rPr lang="en-GB" i="1" dirty="0" smtClean="0"/>
+              <a:t>Interpretable</a:t>
+            </a:r>
+            <a:r>
+              <a:rPr lang="en-GB" dirty="0" smtClean="0"/>
+              <a:t> – results are understandable to normal people</a:t>
+            </a:r>
+            <a:endParaRPr lang="en-GB" i="1" dirty="0" smtClean="0"/>
+          </a:p>
+          <a:p>
+            <a:r>
+              <a:rPr lang="en-GB" i="1" dirty="0" smtClean="0"/>
+              <a:t>Model-agnostic</a:t>
+            </a:r>
+            <a:r>
+              <a:rPr lang="en-GB" dirty="0" smtClean="0"/>
+              <a:t> – works on all models, treated as black-box</a:t>
+            </a:r>
+            <a:endParaRPr lang="en-GB" i="1" dirty="0" smtClean="0"/>
+          </a:p>
+          <a:p>
+            <a:r>
+              <a:rPr lang="en-GB" i="1" dirty="0" smtClean="0"/>
+              <a:t>Explanations</a:t>
+            </a:r>
+            <a:r>
+              <a:rPr lang="en-GB" dirty="0" smtClean="0"/>
+              <a:t> – shows the drivers of the model predictions</a:t>
+            </a:r>
+          </a:p>
+          <a:p>
+            <a:endParaRPr lang="en-GB" i="1" dirty="0" smtClean="0"/>
+          </a:p>
+          <a:p>
+            <a:r>
+              <a:rPr lang="en-GB" dirty="0" smtClean="0"/>
+              <a:t>Can be used on text, images and numerical data</a:t>
+            </a:r>
+            <a:endParaRPr lang="en-GB" dirty="0"/>
+          </a:p>
+          <a:p>
+            <a:endParaRPr lang="en-GB" dirty="0"/>
+          </a:p>
+        </p:txBody>
+      </p:sp>
+    </p:spTree>
+    <p:extLst>
+      <p:ext uri="{BB962C8B-B14F-4D97-AF65-F5344CB8AC3E}">
+        <p14:creationId xmlns:p14="http://schemas.microsoft.com/office/powerpoint/2010/main" val="581693999"/>
+      </p:ext>
+    </p:extLst>
+  </p:cSld>
+  <p:clrMapOvr>
+    <a:masterClrMapping/>
+  </p:clrMapOvr>
+  <p:timing>
+    <p:tnLst>
+      <p:par>
+        <p:cTn id="1" dur="indefinite" restart="never" nodeType="tmRoot"/>
+      </p:par>
+    </p:tnLst>
+  </p:timing>
+</p:sld>
+</file>
+
+<file path=ppt/slides/slide31.xml><?xml version="1.0" encoding="utf-8"?>
+<p:sld xmlns:a="http://schemas.openxmlformats.org/drawingml/2006/main" xmlns:r="http://schemas.openxmlformats.org/officeDocument/2006/relationships" xmlns:p="http://schemas.openxmlformats.org/presentationml/2006/main">
+  <p:cSld>
+    <p:spTree>
+      <p:nvGrpSpPr>
+        <p:cNvPr id="1" name=""/>
+        <p:cNvGrpSpPr/>
+        <p:nvPr/>
+      </p:nvGrpSpPr>
+      <p:grpSpPr>
+        <a:xfrm>
+          <a:off x="0" y="0"/>
+          <a:ext cx="0" cy="0"/>
+          <a:chOff x="0" y="0"/>
+          <a:chExt cx="0" cy="0"/>
+        </a:xfrm>
+      </p:grpSpPr>
+      <p:sp>
+        <p:nvSpPr>
           <p:cNvPr id="3" name="Rectangle 2"/>
           <p:cNvSpPr/>
           <p:nvPr/>
@@ -11845,7 +11890,7 @@
 </p:sld>
 </file>
 
-<file path=ppt/slides/slide31.xml><?xml version="1.0" encoding="utf-8"?>
+<file path=ppt/slides/slide32.xml><?xml version="1.0" encoding="utf-8"?>
 <p:sld xmlns:a="http://schemas.openxmlformats.org/drawingml/2006/main" xmlns:r="http://schemas.openxmlformats.org/officeDocument/2006/relationships" xmlns:p="http://schemas.openxmlformats.org/presentationml/2006/main">
   <p:cSld>
     <p:spTree>
@@ -11958,7 +12003,7 @@
 </p:sld>
 </file>
 
-<file path=ppt/slides/slide32.xml><?xml version="1.0" encoding="utf-8"?>
+<file path=ppt/slides/slide33.xml><?xml version="1.0" encoding="utf-8"?>
 <p:sld xmlns:a="http://schemas.openxmlformats.org/drawingml/2006/main" xmlns:r="http://schemas.openxmlformats.org/officeDocument/2006/relationships" xmlns:p="http://schemas.openxmlformats.org/presentationml/2006/main">
   <p:cSld>
     <p:spTree>
@@ -12071,7 +12116,7 @@
 </p:sld>
 </file>
 
-<file path=ppt/slides/slide33.xml><?xml version="1.0" encoding="utf-8"?>
+<file path=ppt/slides/slide34.xml><?xml version="1.0" encoding="utf-8"?>
 <p:sld xmlns:a="http://schemas.openxmlformats.org/drawingml/2006/main" xmlns:r="http://schemas.openxmlformats.org/officeDocument/2006/relationships" xmlns:p="http://schemas.openxmlformats.org/presentationml/2006/main">
   <p:cSld>
     <p:spTree>
@@ -12150,7 +12195,7 @@
 </p:sld>
 </file>
 
-<file path=ppt/slides/slide34.xml><?xml version="1.0" encoding="utf-8"?>
+<file path=ppt/slides/slide35.xml><?xml version="1.0" encoding="utf-8"?>
 <p:sld xmlns:a="http://schemas.openxmlformats.org/drawingml/2006/main" xmlns:r="http://schemas.openxmlformats.org/officeDocument/2006/relationships" xmlns:p="http://schemas.openxmlformats.org/presentationml/2006/main">
   <p:cSld>
     <p:spTree>
@@ -12413,7 +12458,7 @@
 </p:sld>
 </file>
 
-<file path=ppt/slides/slide35.xml><?xml version="1.0" encoding="utf-8"?>
+<file path=ppt/slides/slide36.xml><?xml version="1.0" encoding="utf-8"?>
 <p:sld xmlns:a="http://schemas.openxmlformats.org/drawingml/2006/main" xmlns:r="http://schemas.openxmlformats.org/officeDocument/2006/relationships" xmlns:p="http://schemas.openxmlformats.org/presentationml/2006/main">
   <p:cSld>
     <p:spTree>
@@ -12526,7 +12571,7 @@
 </p:sld>
 </file>
 
-<file path=ppt/slides/slide36.xml><?xml version="1.0" encoding="utf-8"?>
+<file path=ppt/slides/slide37.xml><?xml version="1.0" encoding="utf-8"?>
 <p:sld xmlns:a="http://schemas.openxmlformats.org/drawingml/2006/main" xmlns:r="http://schemas.openxmlformats.org/officeDocument/2006/relationships" xmlns:p="http://schemas.openxmlformats.org/presentationml/2006/main">
   <p:cSld>
     <p:spTree>
@@ -12639,7 +12684,7 @@
 </p:sld>
 </file>
 
-<file path=ppt/slides/slide37.xml><?xml version="1.0" encoding="utf-8"?>
+<file path=ppt/slides/slide38.xml><?xml version="1.0" encoding="utf-8"?>
 <p:sld xmlns:a="http://schemas.openxmlformats.org/drawingml/2006/main" xmlns:r="http://schemas.openxmlformats.org/officeDocument/2006/relationships" xmlns:p="http://schemas.openxmlformats.org/presentationml/2006/main">
   <p:cSld>
     <p:spTree>
@@ -12932,122 +12977,6 @@
 </p:sld>
 </file>
 
-<file path=ppt/slides/slide38.xml><?xml version="1.0" encoding="utf-8"?>
-<p:sld xmlns:a="http://schemas.openxmlformats.org/drawingml/2006/main" xmlns:r="http://schemas.openxmlformats.org/officeDocument/2006/relationships" xmlns:p="http://schemas.openxmlformats.org/presentationml/2006/main">
-  <p:cSld>
-    <p:spTree>
-      <p:nvGrpSpPr>
-        <p:cNvPr id="1" name=""/>
-        <p:cNvGrpSpPr/>
-        <p:nvPr/>
-      </p:nvGrpSpPr>
-      <p:grpSpPr>
-        <a:xfrm>
-          <a:off x="0" y="0"/>
-          <a:ext cx="0" cy="0"/>
-          <a:chOff x="0" y="0"/>
-          <a:chExt cx="0" cy="0"/>
-        </a:xfrm>
-      </p:grpSpPr>
-      <p:sp>
-        <p:nvSpPr>
-          <p:cNvPr id="2" name="Title 1"/>
-          <p:cNvSpPr>
-            <a:spLocks noGrp="1"/>
-          </p:cNvSpPr>
-          <p:nvPr>
-            <p:ph type="title"/>
-          </p:nvPr>
-        </p:nvSpPr>
-        <p:spPr/>
-        <p:txBody>
-          <a:bodyPr/>
-          <a:lstStyle/>
-          <a:p>
-            <a:r>
-              <a:rPr lang="en-GB" dirty="0" smtClean="0"/>
-              <a:t>What have we done today?</a:t>
-            </a:r>
-            <a:endParaRPr lang="en-GB" dirty="0"/>
-          </a:p>
-        </p:txBody>
-      </p:sp>
-      <p:sp>
-        <p:nvSpPr>
-          <p:cNvPr id="3" name="Content Placeholder 2"/>
-          <p:cNvSpPr>
-            <a:spLocks noGrp="1"/>
-          </p:cNvSpPr>
-          <p:nvPr>
-            <p:ph idx="1"/>
-          </p:nvPr>
-        </p:nvSpPr>
-        <p:spPr/>
-        <p:txBody>
-          <a:bodyPr/>
-          <a:lstStyle/>
-          <a:p>
-            <a:r>
-              <a:rPr lang="en-GB" dirty="0" smtClean="0"/>
-              <a:t>Talked about how to tidy and store text data</a:t>
-            </a:r>
-          </a:p>
-          <a:p>
-            <a:r>
-              <a:rPr lang="en-GB" dirty="0" smtClean="0"/>
-              <a:t>Converted text data into different formats</a:t>
-            </a:r>
-          </a:p>
-          <a:p>
-            <a:r>
-              <a:rPr lang="en-GB" dirty="0" smtClean="0"/>
-              <a:t>Created additional features</a:t>
-            </a:r>
-          </a:p>
-          <a:p>
-            <a:r>
-              <a:rPr lang="en-GB" dirty="0" smtClean="0"/>
-              <a:t>Trained a classification model and predicted results</a:t>
-            </a:r>
-          </a:p>
-          <a:p>
-            <a:r>
-              <a:rPr lang="en-GB" dirty="0" smtClean="0"/>
-              <a:t>Introduced LIME and explained our predictions</a:t>
-            </a:r>
-          </a:p>
-          <a:p>
-            <a:r>
-              <a:rPr lang="en-GB" dirty="0" smtClean="0"/>
-              <a:t>Summarised our results</a:t>
-            </a:r>
-          </a:p>
-          <a:p>
-            <a:pPr lvl="1"/>
-            <a:endParaRPr lang="en-GB" dirty="0"/>
-          </a:p>
-        </p:txBody>
-      </p:sp>
-    </p:spTree>
-    <p:extLst>
-      <p:ext uri="{BB962C8B-B14F-4D97-AF65-F5344CB8AC3E}">
-        <p14:creationId xmlns:p14="http://schemas.microsoft.com/office/powerpoint/2010/main" val="1757762486"/>
-      </p:ext>
-    </p:extLst>
-  </p:cSld>
-  <p:clrMapOvr>
-    <a:masterClrMapping/>
-  </p:clrMapOvr>
-  <p:timing>
-    <p:tnLst>
-      <p:par>
-        <p:cTn id="1" dur="indefinite" restart="never" nodeType="tmRoot"/>
-      </p:par>
-    </p:tnLst>
-  </p:timing>
-</p:sld>
-</file>
-
 <file path=ppt/slides/slide39.xml><?xml version="1.0" encoding="utf-8"?>
 <p:sld xmlns:a="http://schemas.openxmlformats.org/drawingml/2006/main" xmlns:r="http://schemas.openxmlformats.org/officeDocument/2006/relationships" xmlns:p="http://schemas.openxmlformats.org/presentationml/2006/main">
   <p:cSld>
@@ -13082,7 +13011,7 @@
           <a:p>
             <a:r>
               <a:rPr lang="en-GB" dirty="0" smtClean="0"/>
-              <a:t>Learnings</a:t>
+              <a:t>What have we done today?</a:t>
             </a:r>
             <a:endParaRPr lang="en-GB" dirty="0"/>
           </a:p>
@@ -13105,47 +13034,49 @@
           <a:p>
             <a:r>
               <a:rPr lang="en-GB" dirty="0" smtClean="0"/>
-              <a:t>More about 2016 election tweets</a:t>
-            </a:r>
-          </a:p>
-          <a:p>
-            <a:r>
-              <a:rPr lang="en-GB" dirty="0" smtClean="0"/>
-              <a:t>R packages make text analysis straightforward</a:t>
-            </a:r>
-          </a:p>
-          <a:p>
-            <a:r>
-              <a:rPr lang="en-GB" dirty="0" smtClean="0"/>
-              <a:t>We can use LIME to test whether we can trust our models</a:t>
-            </a:r>
-          </a:p>
-          <a:p>
-            <a:r>
-              <a:rPr lang="en-GB" dirty="0" smtClean="0"/>
-              <a:t>Converting text data into different formats allows us to run machine learning models</a:t>
-            </a:r>
-          </a:p>
-          <a:p>
-            <a:r>
-              <a:rPr lang="en-GB" dirty="0"/>
-              <a:t>R</a:t>
-            </a:r>
-            <a:r>
-              <a:rPr lang="en-GB" dirty="0" smtClean="0"/>
-              <a:t>einforced d</a:t>
-            </a:r>
-            <a:r>
-              <a:rPr lang="en-GB" dirty="0" smtClean="0"/>
-              <a:t>ata science is all about testing results against common sense</a:t>
-            </a:r>
+              <a:t>Talked about how to tidy and store text data</a:t>
+            </a:r>
+          </a:p>
+          <a:p>
+            <a:r>
+              <a:rPr lang="en-GB" dirty="0" smtClean="0"/>
+              <a:t>Converted text data into different formats</a:t>
+            </a:r>
+          </a:p>
+          <a:p>
+            <a:r>
+              <a:rPr lang="en-GB" dirty="0" smtClean="0"/>
+              <a:t>Created additional features</a:t>
+            </a:r>
+          </a:p>
+          <a:p>
+            <a:r>
+              <a:rPr lang="en-GB" dirty="0" smtClean="0"/>
+              <a:t>Trained a classification model and predicted results</a:t>
+            </a:r>
+          </a:p>
+          <a:p>
+            <a:r>
+              <a:rPr lang="en-GB" dirty="0" smtClean="0"/>
+              <a:t>Introduced LIME and explained our predictions</a:t>
+            </a:r>
+          </a:p>
+          <a:p>
+            <a:r>
+              <a:rPr lang="en-GB" dirty="0" smtClean="0"/>
+              <a:t>Summarised our results</a:t>
+            </a:r>
+          </a:p>
+          <a:p>
+            <a:pPr lvl="1"/>
+            <a:endParaRPr lang="en-GB" dirty="0"/>
           </a:p>
         </p:txBody>
       </p:sp>
     </p:spTree>
     <p:extLst>
       <p:ext uri="{BB962C8B-B14F-4D97-AF65-F5344CB8AC3E}">
-        <p14:creationId xmlns:p14="http://schemas.microsoft.com/office/powerpoint/2010/main" val="377634843"/>
+        <p14:creationId xmlns:p14="http://schemas.microsoft.com/office/powerpoint/2010/main" val="1757762486"/>
       </p:ext>
     </p:extLst>
   </p:cSld>
@@ -13219,11 +13150,7 @@
           <a:p>
             <a:r>
               <a:rPr lang="en-GB" dirty="0" smtClean="0"/>
-              <a:t>More </a:t>
-            </a:r>
-            <a:r>
-              <a:rPr lang="en-GB" dirty="0" smtClean="0"/>
-              <a:t>data is textual</a:t>
+              <a:t>More data is textual</a:t>
             </a:r>
           </a:p>
           <a:p>
@@ -13235,22 +13162,13 @@
           <a:p>
             <a:r>
               <a:rPr lang="en-GB" dirty="0" smtClean="0"/>
-              <a:t>There is now an analysis framework for text analysis and new packages </a:t>
-            </a:r>
-            <a:r>
-              <a:rPr lang="en-GB" dirty="0" smtClean="0"/>
-              <a:t>that make it more simple</a:t>
-            </a:r>
-            <a:endParaRPr lang="en-GB" dirty="0" smtClean="0"/>
-          </a:p>
-          <a:p>
-            <a:r>
-              <a:rPr lang="en-GB" dirty="0" smtClean="0"/>
-              <a:t>We want to show off how </a:t>
-            </a:r>
-            <a:r>
-              <a:rPr lang="en-GB" dirty="0" smtClean="0"/>
-              <a:t>cool LIME is</a:t>
+              <a:t>There is now an analysis framework for text analysis and new packages that make it more simple</a:t>
+            </a:r>
+          </a:p>
+          <a:p>
+            <a:r>
+              <a:rPr lang="en-GB" dirty="0" smtClean="0"/>
+              <a:t>We want to show off how cool LIME is</a:t>
             </a:r>
             <a:endParaRPr lang="en-GB" dirty="0"/>
           </a:p>
@@ -13316,6 +13234,116 @@
           <a:p>
             <a:r>
               <a:rPr lang="en-GB" dirty="0" smtClean="0"/>
+              <a:t>Learnings</a:t>
+            </a:r>
+            <a:endParaRPr lang="en-GB" dirty="0"/>
+          </a:p>
+        </p:txBody>
+      </p:sp>
+      <p:sp>
+        <p:nvSpPr>
+          <p:cNvPr id="3" name="Content Placeholder 2"/>
+          <p:cNvSpPr>
+            <a:spLocks noGrp="1"/>
+          </p:cNvSpPr>
+          <p:nvPr>
+            <p:ph idx="1"/>
+          </p:nvPr>
+        </p:nvSpPr>
+        <p:spPr/>
+        <p:txBody>
+          <a:bodyPr/>
+          <a:lstStyle/>
+          <a:p>
+            <a:r>
+              <a:rPr lang="en-GB" dirty="0" smtClean="0"/>
+              <a:t>More about 2016 election tweets</a:t>
+            </a:r>
+          </a:p>
+          <a:p>
+            <a:r>
+              <a:rPr lang="en-GB" dirty="0" smtClean="0"/>
+              <a:t>R packages make text analysis straightforward</a:t>
+            </a:r>
+          </a:p>
+          <a:p>
+            <a:r>
+              <a:rPr lang="en-GB" dirty="0" smtClean="0"/>
+              <a:t>We can use LIME to test whether we can trust our models</a:t>
+            </a:r>
+          </a:p>
+          <a:p>
+            <a:r>
+              <a:rPr lang="en-GB" dirty="0" smtClean="0"/>
+              <a:t>Converting text data into different formats allows us to run machine learning models</a:t>
+            </a:r>
+          </a:p>
+          <a:p>
+            <a:r>
+              <a:rPr lang="en-GB" dirty="0"/>
+              <a:t>R</a:t>
+            </a:r>
+            <a:r>
+              <a:rPr lang="en-GB" dirty="0" smtClean="0"/>
+              <a:t>einforced data science is all about testing results against common sense</a:t>
+            </a:r>
+          </a:p>
+        </p:txBody>
+      </p:sp>
+    </p:spTree>
+    <p:extLst>
+      <p:ext uri="{BB962C8B-B14F-4D97-AF65-F5344CB8AC3E}">
+        <p14:creationId xmlns:p14="http://schemas.microsoft.com/office/powerpoint/2010/main" val="377634843"/>
+      </p:ext>
+    </p:extLst>
+  </p:cSld>
+  <p:clrMapOvr>
+    <a:masterClrMapping/>
+  </p:clrMapOvr>
+  <p:timing>
+    <p:tnLst>
+      <p:par>
+        <p:cTn id="1" dur="indefinite" restart="never" nodeType="tmRoot"/>
+      </p:par>
+    </p:tnLst>
+  </p:timing>
+</p:sld>
+</file>
+
+<file path=ppt/slides/slide41.xml><?xml version="1.0" encoding="utf-8"?>
+<p:sld xmlns:a="http://schemas.openxmlformats.org/drawingml/2006/main" xmlns:r="http://schemas.openxmlformats.org/officeDocument/2006/relationships" xmlns:p="http://schemas.openxmlformats.org/presentationml/2006/main">
+  <p:cSld>
+    <p:spTree>
+      <p:nvGrpSpPr>
+        <p:cNvPr id="1" name=""/>
+        <p:cNvGrpSpPr/>
+        <p:nvPr/>
+      </p:nvGrpSpPr>
+      <p:grpSpPr>
+        <a:xfrm>
+          <a:off x="0" y="0"/>
+          <a:ext cx="0" cy="0"/>
+          <a:chOff x="0" y="0"/>
+          <a:chExt cx="0" cy="0"/>
+        </a:xfrm>
+      </p:grpSpPr>
+      <p:sp>
+        <p:nvSpPr>
+          <p:cNvPr id="2" name="Title 1"/>
+          <p:cNvSpPr>
+            <a:spLocks noGrp="1"/>
+          </p:cNvSpPr>
+          <p:nvPr>
+            <p:ph type="title"/>
+          </p:nvPr>
+        </p:nvSpPr>
+        <p:spPr/>
+        <p:txBody>
+          <a:bodyPr/>
+          <a:lstStyle/>
+          <a:p>
+            <a:r>
+              <a:rPr lang="en-GB" dirty="0" smtClean="0"/>
               <a:t>Additional References</a:t>
             </a:r>
             <a:endParaRPr lang="en-GB" dirty="0"/>
@@ -13426,7 +13454,6 @@
               <a:rPr lang="en-GB" sz="2000" dirty="0" smtClean="0"/>
               <a:t> </a:t>
             </a:r>
-            <a:endParaRPr lang="en-GB" sz="2000" dirty="0" smtClean="0"/>
           </a:p>
           <a:p>
             <a:r>
@@ -13492,7 +13519,7 @@
 </p:sld>
 </file>
 
-<file path=ppt/slides/slide41.xml><?xml version="1.0" encoding="utf-8"?>
+<file path=ppt/slides/slide42.xml><?xml version="1.0" encoding="utf-8"?>
 <p:sld xmlns:a="http://schemas.openxmlformats.org/drawingml/2006/main" xmlns:r="http://schemas.openxmlformats.org/officeDocument/2006/relationships" xmlns:p="http://schemas.openxmlformats.org/presentationml/2006/main">
   <p:cSld>
     <p:spTree>
@@ -13764,38 +13791,23 @@
               <a:rPr lang="en-GB" dirty="0" smtClean="0"/>
               <a:t>Format and explore our data</a:t>
             </a:r>
-            <a:endParaRPr lang="en-GB" dirty="0" smtClean="0"/>
-          </a:p>
-          <a:p>
-            <a:r>
-              <a:rPr lang="en-GB" dirty="0" smtClean="0"/>
-              <a:t>Create a classification </a:t>
-            </a:r>
-            <a:r>
-              <a:rPr lang="en-GB" dirty="0" smtClean="0"/>
-              <a:t>model for the tweets</a:t>
-            </a:r>
-            <a:endParaRPr lang="en-GB" dirty="0" smtClean="0"/>
+          </a:p>
+          <a:p>
+            <a:r>
+              <a:rPr lang="en-GB" dirty="0" smtClean="0"/>
+              <a:t>Create a classification model for the tweets</a:t>
+            </a:r>
           </a:p>
           <a:p>
             <a:r>
               <a:rPr lang="en-GB" dirty="0" smtClean="0"/>
               <a:t>Introduce LIME</a:t>
             </a:r>
-            <a:endParaRPr lang="en-GB" dirty="0" smtClean="0"/>
-          </a:p>
-          <a:p>
-            <a:r>
-              <a:rPr lang="en-GB" dirty="0" smtClean="0"/>
-              <a:t>Interpret our models </a:t>
-            </a:r>
-            <a:r>
-              <a:rPr lang="en-GB" dirty="0" smtClean="0"/>
-              <a:t>with </a:t>
-            </a:r>
-            <a:r>
-              <a:rPr lang="en-GB" dirty="0" smtClean="0"/>
-              <a:t>LIME</a:t>
+          </a:p>
+          <a:p>
+            <a:r>
+              <a:rPr lang="en-GB" dirty="0" smtClean="0"/>
+              <a:t>Interpret our models with LIME</a:t>
             </a:r>
           </a:p>
           <a:p>
@@ -13803,7 +13815,6 @@
               <a:rPr lang="en-GB" dirty="0" smtClean="0"/>
               <a:t>Summary &amp; Learnings</a:t>
             </a:r>
-            <a:endParaRPr lang="en-GB" dirty="0" smtClean="0"/>
           </a:p>
           <a:p>
             <a:endParaRPr lang="en-GB" dirty="0" smtClean="0"/>
@@ -13867,11 +13878,7 @@
           <a:p>
             <a:r>
               <a:rPr lang="en-GB" dirty="0" smtClean="0"/>
-              <a:t>Our </a:t>
-            </a:r>
-            <a:r>
-              <a:rPr lang="en-GB" dirty="0" smtClean="0"/>
-              <a:t>Text Data</a:t>
+              <a:t>Our Text Data</a:t>
             </a:r>
             <a:endParaRPr lang="en-GB" dirty="0"/>
           </a:p>
@@ -13894,23 +13901,7 @@
           <a:p>
             <a:r>
               <a:rPr lang="en-GB" dirty="0" smtClean="0"/>
-              <a:t>Our </a:t>
-            </a:r>
-            <a:r>
-              <a:rPr lang="en-GB" dirty="0" smtClean="0"/>
-              <a:t>data is </a:t>
-            </a:r>
-            <a:r>
-              <a:rPr lang="en-GB" dirty="0" smtClean="0"/>
-              <a:t>~3,000 tweets by Hilary Clinton and Donald Trump from </a:t>
-            </a:r>
-            <a:r>
-              <a:rPr lang="en-GB" dirty="0" smtClean="0"/>
-              <a:t>over </a:t>
-            </a:r>
-            <a:r>
-              <a:rPr lang="en-GB" dirty="0" smtClean="0"/>
-              <a:t>2016 (during the run up to the election)</a:t>
+              <a:t>Our data is ~3,000 tweets by Hilary Clinton and Donald Trump from over 2016 (during the run up to the election)</a:t>
             </a:r>
           </a:p>
           <a:p>
@@ -13924,7 +13915,6 @@
               <a:rPr lang="en-GB" dirty="0" smtClean="0"/>
               <a:t>Stored in a .csv file</a:t>
             </a:r>
-            <a:endParaRPr lang="en-GB" dirty="0" smtClean="0"/>
           </a:p>
           <a:p>
             <a:pPr marL="0" indent="0">

</xml_diff>